<commit_message>
Assignment 1 done, texturing done Signed-off-by: STUDENT Jack Patterson <Jack.Patterson@students.ittralee.ie>
</commit_message>
<xml_diff>
--- a/J_Graphics_PP.pptx
+++ b/J_Graphics_PP.pptx
@@ -11,6 +11,8 @@
     <p:sldId id="261" r:id="rId5"/>
     <p:sldId id="262" r:id="rId6"/>
     <p:sldId id="263" r:id="rId7"/>
+    <p:sldId id="264" r:id="rId8"/>
+    <p:sldId id="265" r:id="rId9"/>
   </p:sldIdLst>
   <p:sldSz cx="12192000" cy="6858000"/>
   <p:notesSz cx="6858000" cy="9144000"/>
@@ -1808,7 +1810,7 @@
           <a:p>
             <a:fld id="{D8DD123C-D314-4DDA-BD7B-79F1D0830E10}" type="datetimeFigureOut">
               <a:rPr lang="en-IE" smtClean="0"/>
-              <a:t>26/09/2022</a:t>
+              <a:t>18/10/2022</a:t>
             </a:fld>
             <a:endParaRPr lang="en-IE"/>
           </a:p>
@@ -2008,7 +2010,7 @@
           <a:p>
             <a:fld id="{D8DD123C-D314-4DDA-BD7B-79F1D0830E10}" type="datetimeFigureOut">
               <a:rPr lang="en-IE" smtClean="0"/>
-              <a:t>26/09/2022</a:t>
+              <a:t>18/10/2022</a:t>
             </a:fld>
             <a:endParaRPr lang="en-IE"/>
           </a:p>
@@ -2218,7 +2220,7 @@
           <a:p>
             <a:fld id="{D8DD123C-D314-4DDA-BD7B-79F1D0830E10}" type="datetimeFigureOut">
               <a:rPr lang="en-IE" smtClean="0"/>
-              <a:t>26/09/2022</a:t>
+              <a:t>18/10/2022</a:t>
             </a:fld>
             <a:endParaRPr lang="en-IE"/>
           </a:p>
@@ -2418,7 +2420,7 @@
           <a:p>
             <a:fld id="{D8DD123C-D314-4DDA-BD7B-79F1D0830E10}" type="datetimeFigureOut">
               <a:rPr lang="en-IE" smtClean="0"/>
-              <a:t>26/09/2022</a:t>
+              <a:t>18/10/2022</a:t>
             </a:fld>
             <a:endParaRPr lang="en-IE"/>
           </a:p>
@@ -2694,7 +2696,7 @@
           <a:p>
             <a:fld id="{D8DD123C-D314-4DDA-BD7B-79F1D0830E10}" type="datetimeFigureOut">
               <a:rPr lang="en-IE" smtClean="0"/>
-              <a:t>26/09/2022</a:t>
+              <a:t>18/10/2022</a:t>
             </a:fld>
             <a:endParaRPr lang="en-IE"/>
           </a:p>
@@ -2962,7 +2964,7 @@
           <a:p>
             <a:fld id="{D8DD123C-D314-4DDA-BD7B-79F1D0830E10}" type="datetimeFigureOut">
               <a:rPr lang="en-IE" smtClean="0"/>
-              <a:t>26/09/2022</a:t>
+              <a:t>18/10/2022</a:t>
             </a:fld>
             <a:endParaRPr lang="en-IE"/>
           </a:p>
@@ -3377,7 +3379,7 @@
           <a:p>
             <a:fld id="{D8DD123C-D314-4DDA-BD7B-79F1D0830E10}" type="datetimeFigureOut">
               <a:rPr lang="en-IE" smtClean="0"/>
-              <a:t>26/09/2022</a:t>
+              <a:t>18/10/2022</a:t>
             </a:fld>
             <a:endParaRPr lang="en-IE"/>
           </a:p>
@@ -3519,7 +3521,7 @@
           <a:p>
             <a:fld id="{D8DD123C-D314-4DDA-BD7B-79F1D0830E10}" type="datetimeFigureOut">
               <a:rPr lang="en-IE" smtClean="0"/>
-              <a:t>26/09/2022</a:t>
+              <a:t>18/10/2022</a:t>
             </a:fld>
             <a:endParaRPr lang="en-IE"/>
           </a:p>
@@ -3632,7 +3634,7 @@
           <a:p>
             <a:fld id="{D8DD123C-D314-4DDA-BD7B-79F1D0830E10}" type="datetimeFigureOut">
               <a:rPr lang="en-IE" smtClean="0"/>
-              <a:t>26/09/2022</a:t>
+              <a:t>18/10/2022</a:t>
             </a:fld>
             <a:endParaRPr lang="en-IE"/>
           </a:p>
@@ -3945,7 +3947,7 @@
           <a:p>
             <a:fld id="{D8DD123C-D314-4DDA-BD7B-79F1D0830E10}" type="datetimeFigureOut">
               <a:rPr lang="en-IE" smtClean="0"/>
-              <a:t>26/09/2022</a:t>
+              <a:t>18/10/2022</a:t>
             </a:fld>
             <a:endParaRPr lang="en-IE"/>
           </a:p>
@@ -4234,7 +4236,7 @@
           <a:p>
             <a:fld id="{D8DD123C-D314-4DDA-BD7B-79F1D0830E10}" type="datetimeFigureOut">
               <a:rPr lang="en-IE" smtClean="0"/>
-              <a:t>26/09/2022</a:t>
+              <a:t>18/10/2022</a:t>
             </a:fld>
             <a:endParaRPr lang="en-IE"/>
           </a:p>
@@ -4477,7 +4479,7 @@
           <a:p>
             <a:fld id="{D8DD123C-D314-4DDA-BD7B-79F1D0830E10}" type="datetimeFigureOut">
               <a:rPr lang="en-IE" smtClean="0"/>
-              <a:t>26/09/2022</a:t>
+              <a:t>18/10/2022</a:t>
             </a:fld>
             <a:endParaRPr lang="en-IE"/>
           </a:p>
@@ -18489,6 +18491,4218 @@
 </p:sld>
 </file>
 
+<file path=ppt/slides/slide7.xml><?xml version="1.0" encoding="utf-8"?>
+<p:sld xmlns:a="http://schemas.openxmlformats.org/drawingml/2006/main" xmlns:r="http://schemas.openxmlformats.org/officeDocument/2006/relationships" xmlns:p="http://schemas.openxmlformats.org/presentationml/2006/main">
+  <p:cSld>
+    <p:spTree>
+      <p:nvGrpSpPr>
+        <p:cNvPr id="1" name=""/>
+        <p:cNvGrpSpPr/>
+        <p:nvPr/>
+      </p:nvGrpSpPr>
+      <p:grpSpPr>
+        <a:xfrm>
+          <a:off x="0" y="0"/>
+          <a:ext cx="0" cy="0"/>
+          <a:chOff x="0" y="0"/>
+          <a:chExt cx="0" cy="0"/>
+        </a:xfrm>
+      </p:grpSpPr>
+      <p:pic>
+        <p:nvPicPr>
+          <p:cNvPr id="3" name="Picture 2">
+            <a:extLst>
+              <a:ext uri="{FF2B5EF4-FFF2-40B4-BE49-F238E27FC236}">
+                <a16:creationId xmlns:a16="http://schemas.microsoft.com/office/drawing/2014/main" id="{83441F0F-CE5F-43E0-B269-DDFAA7A69100}"/>
+              </a:ext>
+            </a:extLst>
+          </p:cNvPr>
+          <p:cNvPicPr>
+            <a:picLocks noChangeAspect="1"/>
+          </p:cNvPicPr>
+          <p:nvPr/>
+        </p:nvPicPr>
+        <p:blipFill>
+          <a:blip r:embed="rId2">
+            <a:extLst>
+              <a:ext uri="{28A0092B-C50C-407E-A947-70E740481C1C}">
+                <a14:useLocalDpi xmlns:a14="http://schemas.microsoft.com/office/drawing/2010/main" val="0"/>
+              </a:ext>
+            </a:extLst>
+          </a:blip>
+          <a:stretch>
+            <a:fillRect/>
+          </a:stretch>
+        </p:blipFill>
+        <p:spPr>
+          <a:xfrm>
+            <a:off x="1174459" y="167779"/>
+            <a:ext cx="8669323" cy="8669323"/>
+          </a:xfrm>
+          <a:prstGeom prst="rect">
+            <a:avLst/>
+          </a:prstGeom>
+        </p:spPr>
+      </p:pic>
+      <p:sp>
+        <p:nvSpPr>
+          <p:cNvPr id="15" name="TextBox 14">
+            <a:extLst>
+              <a:ext uri="{FF2B5EF4-FFF2-40B4-BE49-F238E27FC236}">
+                <a16:creationId xmlns:a16="http://schemas.microsoft.com/office/drawing/2014/main" id="{C2023A06-198B-4D61-A7CE-8A2B8F9CB8AC}"/>
+              </a:ext>
+            </a:extLst>
+          </p:cNvPr>
+          <p:cNvSpPr txBox="1"/>
+          <p:nvPr/>
+        </p:nvSpPr>
+        <p:spPr>
+          <a:xfrm>
+            <a:off x="2348218" y="1174351"/>
+            <a:ext cx="301686" cy="369332"/>
+          </a:xfrm>
+          <a:prstGeom prst="rect">
+            <a:avLst/>
+          </a:prstGeom>
+          <a:noFill/>
+        </p:spPr>
+        <p:txBody>
+          <a:bodyPr wrap="none" rtlCol="0">
+            <a:spAutoFit/>
+          </a:bodyPr>
+          <a:lstStyle/>
+          <a:p>
+            <a:r>
+              <a:rPr lang="en-IE" dirty="0"/>
+              <a:t>1</a:t>
+            </a:r>
+          </a:p>
+        </p:txBody>
+      </p:sp>
+      <p:sp>
+        <p:nvSpPr>
+          <p:cNvPr id="16" name="TextBox 15">
+            <a:extLst>
+              <a:ext uri="{FF2B5EF4-FFF2-40B4-BE49-F238E27FC236}">
+                <a16:creationId xmlns:a16="http://schemas.microsoft.com/office/drawing/2014/main" id="{9573BFA1-9C77-437B-97C1-9E56F2100013}"/>
+              </a:ext>
+            </a:extLst>
+          </p:cNvPr>
+          <p:cNvSpPr txBox="1"/>
+          <p:nvPr/>
+        </p:nvSpPr>
+        <p:spPr>
+          <a:xfrm>
+            <a:off x="5358277" y="1174351"/>
+            <a:ext cx="301686" cy="369332"/>
+          </a:xfrm>
+          <a:prstGeom prst="rect">
+            <a:avLst/>
+          </a:prstGeom>
+          <a:noFill/>
+        </p:spPr>
+        <p:txBody>
+          <a:bodyPr wrap="none" rtlCol="0">
+            <a:spAutoFit/>
+          </a:bodyPr>
+          <a:lstStyle/>
+          <a:p>
+            <a:r>
+              <a:rPr lang="en-IE" dirty="0"/>
+              <a:t>2</a:t>
+            </a:r>
+          </a:p>
+        </p:txBody>
+      </p:sp>
+      <p:sp>
+        <p:nvSpPr>
+          <p:cNvPr id="17" name="TextBox 16">
+            <a:extLst>
+              <a:ext uri="{FF2B5EF4-FFF2-40B4-BE49-F238E27FC236}">
+                <a16:creationId xmlns:a16="http://schemas.microsoft.com/office/drawing/2014/main" id="{1765F4FA-CD65-4C2B-8F22-3F7EE69285F3}"/>
+              </a:ext>
+            </a:extLst>
+          </p:cNvPr>
+          <p:cNvSpPr txBox="1"/>
+          <p:nvPr/>
+        </p:nvSpPr>
+        <p:spPr>
+          <a:xfrm>
+            <a:off x="2348218" y="1779757"/>
+            <a:ext cx="301686" cy="369332"/>
+          </a:xfrm>
+          <a:prstGeom prst="rect">
+            <a:avLst/>
+          </a:prstGeom>
+          <a:noFill/>
+        </p:spPr>
+        <p:txBody>
+          <a:bodyPr wrap="none" rtlCol="0">
+            <a:spAutoFit/>
+          </a:bodyPr>
+          <a:lstStyle/>
+          <a:p>
+            <a:r>
+              <a:rPr lang="en-IE" dirty="0"/>
+              <a:t>3</a:t>
+            </a:r>
+          </a:p>
+        </p:txBody>
+      </p:sp>
+      <p:sp>
+        <p:nvSpPr>
+          <p:cNvPr id="18" name="TextBox 17">
+            <a:extLst>
+              <a:ext uri="{FF2B5EF4-FFF2-40B4-BE49-F238E27FC236}">
+                <a16:creationId xmlns:a16="http://schemas.microsoft.com/office/drawing/2014/main" id="{75A6E180-E1E2-4289-B6BC-C6CDFDAC5335}"/>
+              </a:ext>
+            </a:extLst>
+          </p:cNvPr>
+          <p:cNvSpPr txBox="1"/>
+          <p:nvPr/>
+        </p:nvSpPr>
+        <p:spPr>
+          <a:xfrm>
+            <a:off x="5358277" y="1779757"/>
+            <a:ext cx="301686" cy="369332"/>
+          </a:xfrm>
+          <a:prstGeom prst="rect">
+            <a:avLst/>
+          </a:prstGeom>
+          <a:noFill/>
+        </p:spPr>
+        <p:txBody>
+          <a:bodyPr wrap="none" rtlCol="0">
+            <a:spAutoFit/>
+          </a:bodyPr>
+          <a:lstStyle/>
+          <a:p>
+            <a:r>
+              <a:rPr lang="en-IE" dirty="0"/>
+              <a:t>4</a:t>
+            </a:r>
+          </a:p>
+        </p:txBody>
+      </p:sp>
+      <p:sp>
+        <p:nvSpPr>
+          <p:cNvPr id="19" name="TextBox 18">
+            <a:extLst>
+              <a:ext uri="{FF2B5EF4-FFF2-40B4-BE49-F238E27FC236}">
+                <a16:creationId xmlns:a16="http://schemas.microsoft.com/office/drawing/2014/main" id="{81A6FC59-0601-46FF-A797-63E5AC6E731E}"/>
+              </a:ext>
+            </a:extLst>
+          </p:cNvPr>
+          <p:cNvSpPr txBox="1"/>
+          <p:nvPr/>
+        </p:nvSpPr>
+        <p:spPr>
+          <a:xfrm>
+            <a:off x="3551561" y="1838480"/>
+            <a:ext cx="301686" cy="369332"/>
+          </a:xfrm>
+          <a:prstGeom prst="rect">
+            <a:avLst/>
+          </a:prstGeom>
+          <a:noFill/>
+        </p:spPr>
+        <p:txBody>
+          <a:bodyPr wrap="none" rtlCol="0">
+            <a:spAutoFit/>
+          </a:bodyPr>
+          <a:lstStyle/>
+          <a:p>
+            <a:r>
+              <a:rPr lang="en-IE" dirty="0"/>
+              <a:t>5</a:t>
+            </a:r>
+          </a:p>
+        </p:txBody>
+      </p:sp>
+      <p:sp>
+        <p:nvSpPr>
+          <p:cNvPr id="20" name="TextBox 19">
+            <a:extLst>
+              <a:ext uri="{FF2B5EF4-FFF2-40B4-BE49-F238E27FC236}">
+                <a16:creationId xmlns:a16="http://schemas.microsoft.com/office/drawing/2014/main" id="{DCE8BB59-0BA3-412E-B918-63D0614E3D48}"/>
+              </a:ext>
+            </a:extLst>
+          </p:cNvPr>
+          <p:cNvSpPr txBox="1"/>
+          <p:nvPr/>
+        </p:nvSpPr>
+        <p:spPr>
+          <a:xfrm>
+            <a:off x="4153233" y="1779757"/>
+            <a:ext cx="301686" cy="369332"/>
+          </a:xfrm>
+          <a:prstGeom prst="rect">
+            <a:avLst/>
+          </a:prstGeom>
+          <a:noFill/>
+        </p:spPr>
+        <p:txBody>
+          <a:bodyPr wrap="none" rtlCol="0">
+            <a:spAutoFit/>
+          </a:bodyPr>
+          <a:lstStyle/>
+          <a:p>
+            <a:r>
+              <a:rPr lang="en-IE" dirty="0"/>
+              <a:t>6</a:t>
+            </a:r>
+          </a:p>
+        </p:txBody>
+      </p:sp>
+      <p:sp>
+        <p:nvSpPr>
+          <p:cNvPr id="21" name="TextBox 20">
+            <a:extLst>
+              <a:ext uri="{FF2B5EF4-FFF2-40B4-BE49-F238E27FC236}">
+                <a16:creationId xmlns:a16="http://schemas.microsoft.com/office/drawing/2014/main" id="{FDE83407-C4AB-4C5C-BFCE-FC405DFEE12B}"/>
+              </a:ext>
+            </a:extLst>
+          </p:cNvPr>
+          <p:cNvSpPr txBox="1"/>
+          <p:nvPr/>
+        </p:nvSpPr>
+        <p:spPr>
+          <a:xfrm>
+            <a:off x="3473741" y="4883683"/>
+            <a:ext cx="301686" cy="369332"/>
+          </a:xfrm>
+          <a:prstGeom prst="rect">
+            <a:avLst/>
+          </a:prstGeom>
+          <a:noFill/>
+        </p:spPr>
+        <p:txBody>
+          <a:bodyPr wrap="none" rtlCol="0">
+            <a:spAutoFit/>
+          </a:bodyPr>
+          <a:lstStyle/>
+          <a:p>
+            <a:r>
+              <a:rPr lang="en-IE" dirty="0"/>
+              <a:t>7</a:t>
+            </a:r>
+          </a:p>
+        </p:txBody>
+      </p:sp>
+      <p:sp>
+        <p:nvSpPr>
+          <p:cNvPr id="22" name="TextBox 21">
+            <a:extLst>
+              <a:ext uri="{FF2B5EF4-FFF2-40B4-BE49-F238E27FC236}">
+                <a16:creationId xmlns:a16="http://schemas.microsoft.com/office/drawing/2014/main" id="{C2D55637-537A-4788-8CA9-03E4E45BCFD2}"/>
+              </a:ext>
+            </a:extLst>
+          </p:cNvPr>
+          <p:cNvSpPr txBox="1"/>
+          <p:nvPr/>
+        </p:nvSpPr>
+        <p:spPr>
+          <a:xfrm>
+            <a:off x="4153233" y="4883683"/>
+            <a:ext cx="301686" cy="369332"/>
+          </a:xfrm>
+          <a:prstGeom prst="rect">
+            <a:avLst/>
+          </a:prstGeom>
+          <a:noFill/>
+        </p:spPr>
+        <p:txBody>
+          <a:bodyPr wrap="none" rtlCol="0">
+            <a:spAutoFit/>
+          </a:bodyPr>
+          <a:lstStyle/>
+          <a:p>
+            <a:r>
+              <a:rPr lang="en-IE" dirty="0"/>
+              <a:t>8</a:t>
+            </a:r>
+          </a:p>
+        </p:txBody>
+      </p:sp>
+      <p:sp>
+        <p:nvSpPr>
+          <p:cNvPr id="23" name="TextBox 22">
+            <a:extLst>
+              <a:ext uri="{FF2B5EF4-FFF2-40B4-BE49-F238E27FC236}">
+                <a16:creationId xmlns:a16="http://schemas.microsoft.com/office/drawing/2014/main" id="{5FDB87AB-2739-40FD-8B4C-D4EDE28595A9}"/>
+              </a:ext>
+            </a:extLst>
+          </p:cNvPr>
+          <p:cNvSpPr txBox="1"/>
+          <p:nvPr/>
+        </p:nvSpPr>
+        <p:spPr>
+          <a:xfrm>
+            <a:off x="3551561" y="5563192"/>
+            <a:ext cx="418704" cy="369332"/>
+          </a:xfrm>
+          <a:prstGeom prst="rect">
+            <a:avLst/>
+          </a:prstGeom>
+          <a:noFill/>
+        </p:spPr>
+        <p:txBody>
+          <a:bodyPr wrap="none" rtlCol="0">
+            <a:spAutoFit/>
+          </a:bodyPr>
+          <a:lstStyle/>
+          <a:p>
+            <a:r>
+              <a:rPr lang="en-IE" dirty="0"/>
+              <a:t>19</a:t>
+            </a:r>
+          </a:p>
+        </p:txBody>
+      </p:sp>
+      <p:sp>
+        <p:nvSpPr>
+          <p:cNvPr id="24" name="TextBox 23">
+            <a:extLst>
+              <a:ext uri="{FF2B5EF4-FFF2-40B4-BE49-F238E27FC236}">
+                <a16:creationId xmlns:a16="http://schemas.microsoft.com/office/drawing/2014/main" id="{ED985B89-D7A3-4B8D-85E8-E68D4969478E}"/>
+              </a:ext>
+            </a:extLst>
+          </p:cNvPr>
+          <p:cNvSpPr txBox="1"/>
+          <p:nvPr/>
+        </p:nvSpPr>
+        <p:spPr>
+          <a:xfrm>
+            <a:off x="1803632" y="4883683"/>
+            <a:ext cx="444617" cy="369332"/>
+          </a:xfrm>
+          <a:prstGeom prst="rect">
+            <a:avLst/>
+          </a:prstGeom>
+          <a:noFill/>
+        </p:spPr>
+        <p:txBody>
+          <a:bodyPr wrap="square" rtlCol="0">
+            <a:spAutoFit/>
+          </a:bodyPr>
+          <a:lstStyle/>
+          <a:p>
+            <a:r>
+              <a:rPr lang="en-IE" dirty="0"/>
+              <a:t>10</a:t>
+            </a:r>
+          </a:p>
+        </p:txBody>
+      </p:sp>
+      <p:sp>
+        <p:nvSpPr>
+          <p:cNvPr id="25" name="TextBox 24">
+            <a:extLst>
+              <a:ext uri="{FF2B5EF4-FFF2-40B4-BE49-F238E27FC236}">
+                <a16:creationId xmlns:a16="http://schemas.microsoft.com/office/drawing/2014/main" id="{C4645D5D-20B6-49CF-BD55-97E4BC7FFE0B}"/>
+              </a:ext>
+            </a:extLst>
+          </p:cNvPr>
+          <p:cNvSpPr txBox="1"/>
+          <p:nvPr/>
+        </p:nvSpPr>
+        <p:spPr>
+          <a:xfrm>
+            <a:off x="1724254" y="5504469"/>
+            <a:ext cx="418704" cy="369332"/>
+          </a:xfrm>
+          <a:prstGeom prst="rect">
+            <a:avLst/>
+          </a:prstGeom>
+          <a:noFill/>
+        </p:spPr>
+        <p:txBody>
+          <a:bodyPr wrap="none" rtlCol="0">
+            <a:spAutoFit/>
+          </a:bodyPr>
+          <a:lstStyle/>
+          <a:p>
+            <a:r>
+              <a:rPr lang="en-IE" dirty="0"/>
+              <a:t>11</a:t>
+            </a:r>
+          </a:p>
+        </p:txBody>
+      </p:sp>
+      <p:sp>
+        <p:nvSpPr>
+          <p:cNvPr id="26" name="TextBox 25">
+            <a:extLst>
+              <a:ext uri="{FF2B5EF4-FFF2-40B4-BE49-F238E27FC236}">
+                <a16:creationId xmlns:a16="http://schemas.microsoft.com/office/drawing/2014/main" id="{8A57D660-49D9-4D7D-9DC5-69CA6F1B5239}"/>
+              </a:ext>
+            </a:extLst>
+          </p:cNvPr>
+          <p:cNvSpPr txBox="1"/>
+          <p:nvPr/>
+        </p:nvSpPr>
+        <p:spPr>
+          <a:xfrm>
+            <a:off x="3610070" y="3630523"/>
+            <a:ext cx="301686" cy="369332"/>
+          </a:xfrm>
+          <a:prstGeom prst="rect">
+            <a:avLst/>
+          </a:prstGeom>
+          <a:noFill/>
+        </p:spPr>
+        <p:txBody>
+          <a:bodyPr wrap="none" rtlCol="0">
+            <a:spAutoFit/>
+          </a:bodyPr>
+          <a:lstStyle/>
+          <a:p>
+            <a:r>
+              <a:rPr lang="en-IE" dirty="0"/>
+              <a:t>0</a:t>
+            </a:r>
+          </a:p>
+        </p:txBody>
+      </p:sp>
+      <p:sp>
+        <p:nvSpPr>
+          <p:cNvPr id="27" name="TextBox 26">
+            <a:extLst>
+              <a:ext uri="{FF2B5EF4-FFF2-40B4-BE49-F238E27FC236}">
+                <a16:creationId xmlns:a16="http://schemas.microsoft.com/office/drawing/2014/main" id="{5761A7C4-8C1E-446F-8A5A-20DD4E649494}"/>
+              </a:ext>
+            </a:extLst>
+          </p:cNvPr>
+          <p:cNvSpPr txBox="1"/>
+          <p:nvPr/>
+        </p:nvSpPr>
+        <p:spPr>
+          <a:xfrm>
+            <a:off x="7735348" y="3692447"/>
+            <a:ext cx="418704" cy="369332"/>
+          </a:xfrm>
+          <a:prstGeom prst="rect">
+            <a:avLst/>
+          </a:prstGeom>
+          <a:noFill/>
+        </p:spPr>
+        <p:txBody>
+          <a:bodyPr wrap="none" rtlCol="0">
+            <a:spAutoFit/>
+          </a:bodyPr>
+          <a:lstStyle/>
+          <a:p>
+            <a:r>
+              <a:rPr lang="en-IE" dirty="0"/>
+              <a:t>12</a:t>
+            </a:r>
+          </a:p>
+        </p:txBody>
+      </p:sp>
+      <p:sp>
+        <p:nvSpPr>
+          <p:cNvPr id="28" name="TextBox 27">
+            <a:extLst>
+              <a:ext uri="{FF2B5EF4-FFF2-40B4-BE49-F238E27FC236}">
+                <a16:creationId xmlns:a16="http://schemas.microsoft.com/office/drawing/2014/main" id="{BB733A21-2F32-4884-B899-3A6D47DE28A8}"/>
+              </a:ext>
+            </a:extLst>
+          </p:cNvPr>
+          <p:cNvSpPr txBox="1"/>
+          <p:nvPr/>
+        </p:nvSpPr>
+        <p:spPr>
+          <a:xfrm>
+            <a:off x="8976919" y="1174351"/>
+            <a:ext cx="418704" cy="369332"/>
+          </a:xfrm>
+          <a:prstGeom prst="rect">
+            <a:avLst/>
+          </a:prstGeom>
+          <a:noFill/>
+        </p:spPr>
+        <p:txBody>
+          <a:bodyPr wrap="none" rtlCol="0">
+            <a:spAutoFit/>
+          </a:bodyPr>
+          <a:lstStyle/>
+          <a:p>
+            <a:r>
+              <a:rPr lang="en-IE" dirty="0"/>
+              <a:t>13</a:t>
+            </a:r>
+          </a:p>
+        </p:txBody>
+      </p:sp>
+      <p:sp>
+        <p:nvSpPr>
+          <p:cNvPr id="29" name="TextBox 28">
+            <a:extLst>
+              <a:ext uri="{FF2B5EF4-FFF2-40B4-BE49-F238E27FC236}">
+                <a16:creationId xmlns:a16="http://schemas.microsoft.com/office/drawing/2014/main" id="{5A6A018A-699B-45A8-B76E-8692E84753FE}"/>
+              </a:ext>
+            </a:extLst>
+          </p:cNvPr>
+          <p:cNvSpPr txBox="1"/>
+          <p:nvPr/>
+        </p:nvSpPr>
+        <p:spPr>
+          <a:xfrm>
+            <a:off x="5966860" y="1174351"/>
+            <a:ext cx="418704" cy="369332"/>
+          </a:xfrm>
+          <a:prstGeom prst="rect">
+            <a:avLst/>
+          </a:prstGeom>
+          <a:noFill/>
+        </p:spPr>
+        <p:txBody>
+          <a:bodyPr wrap="square" rtlCol="0">
+            <a:spAutoFit/>
+          </a:bodyPr>
+          <a:lstStyle/>
+          <a:p>
+            <a:r>
+              <a:rPr lang="en-IE" dirty="0"/>
+              <a:t>14</a:t>
+            </a:r>
+          </a:p>
+        </p:txBody>
+      </p:sp>
+      <p:sp>
+        <p:nvSpPr>
+          <p:cNvPr id="30" name="TextBox 29">
+            <a:extLst>
+              <a:ext uri="{FF2B5EF4-FFF2-40B4-BE49-F238E27FC236}">
+                <a16:creationId xmlns:a16="http://schemas.microsoft.com/office/drawing/2014/main" id="{5F7E8C4B-5151-464C-A271-F29BF3922358}"/>
+              </a:ext>
+            </a:extLst>
+          </p:cNvPr>
+          <p:cNvSpPr txBox="1"/>
+          <p:nvPr/>
+        </p:nvSpPr>
+        <p:spPr>
+          <a:xfrm>
+            <a:off x="8976919" y="1838480"/>
+            <a:ext cx="418704" cy="369332"/>
+          </a:xfrm>
+          <a:prstGeom prst="rect">
+            <a:avLst/>
+          </a:prstGeom>
+          <a:noFill/>
+        </p:spPr>
+        <p:txBody>
+          <a:bodyPr wrap="none" rtlCol="0">
+            <a:spAutoFit/>
+          </a:bodyPr>
+          <a:lstStyle/>
+          <a:p>
+            <a:r>
+              <a:rPr lang="en-IE" dirty="0"/>
+              <a:t>15</a:t>
+            </a:r>
+          </a:p>
+        </p:txBody>
+      </p:sp>
+      <p:sp>
+        <p:nvSpPr>
+          <p:cNvPr id="31" name="TextBox 30">
+            <a:extLst>
+              <a:ext uri="{FF2B5EF4-FFF2-40B4-BE49-F238E27FC236}">
+                <a16:creationId xmlns:a16="http://schemas.microsoft.com/office/drawing/2014/main" id="{0BFB105B-34CE-4F05-B899-942EA5ED25B5}"/>
+              </a:ext>
+            </a:extLst>
+          </p:cNvPr>
+          <p:cNvSpPr txBox="1"/>
+          <p:nvPr/>
+        </p:nvSpPr>
+        <p:spPr>
+          <a:xfrm>
+            <a:off x="5945157" y="1779757"/>
+            <a:ext cx="418704" cy="369332"/>
+          </a:xfrm>
+          <a:prstGeom prst="rect">
+            <a:avLst/>
+          </a:prstGeom>
+          <a:noFill/>
+        </p:spPr>
+        <p:txBody>
+          <a:bodyPr wrap="none" rtlCol="0">
+            <a:spAutoFit/>
+          </a:bodyPr>
+          <a:lstStyle/>
+          <a:p>
+            <a:r>
+              <a:rPr lang="en-IE" dirty="0"/>
+              <a:t>16</a:t>
+            </a:r>
+          </a:p>
+        </p:txBody>
+      </p:sp>
+      <p:sp>
+        <p:nvSpPr>
+          <p:cNvPr id="32" name="TextBox 31">
+            <a:extLst>
+              <a:ext uri="{FF2B5EF4-FFF2-40B4-BE49-F238E27FC236}">
+                <a16:creationId xmlns:a16="http://schemas.microsoft.com/office/drawing/2014/main" id="{443B2001-E72E-443E-90D4-0D376F2495A2}"/>
+              </a:ext>
+            </a:extLst>
+          </p:cNvPr>
+          <p:cNvSpPr txBox="1"/>
+          <p:nvPr/>
+        </p:nvSpPr>
+        <p:spPr>
+          <a:xfrm>
+            <a:off x="7167598" y="1873326"/>
+            <a:ext cx="418704" cy="369332"/>
+          </a:xfrm>
+          <a:prstGeom prst="rect">
+            <a:avLst/>
+          </a:prstGeom>
+          <a:noFill/>
+        </p:spPr>
+        <p:txBody>
+          <a:bodyPr wrap="none" rtlCol="0">
+            <a:spAutoFit/>
+          </a:bodyPr>
+          <a:lstStyle/>
+          <a:p>
+            <a:r>
+              <a:rPr lang="en-IE" dirty="0"/>
+              <a:t>17</a:t>
+            </a:r>
+          </a:p>
+        </p:txBody>
+      </p:sp>
+      <p:sp>
+        <p:nvSpPr>
+          <p:cNvPr id="33" name="TextBox 32">
+            <a:extLst>
+              <a:ext uri="{FF2B5EF4-FFF2-40B4-BE49-F238E27FC236}">
+                <a16:creationId xmlns:a16="http://schemas.microsoft.com/office/drawing/2014/main" id="{AC6210B3-2533-46AE-B41D-23F349B425B7}"/>
+              </a:ext>
+            </a:extLst>
+          </p:cNvPr>
+          <p:cNvSpPr txBox="1"/>
+          <p:nvPr/>
+        </p:nvSpPr>
+        <p:spPr>
+          <a:xfrm>
+            <a:off x="7720653" y="1838480"/>
+            <a:ext cx="418704" cy="369332"/>
+          </a:xfrm>
+          <a:prstGeom prst="rect">
+            <a:avLst/>
+          </a:prstGeom>
+          <a:noFill/>
+        </p:spPr>
+        <p:txBody>
+          <a:bodyPr wrap="none" rtlCol="0">
+            <a:spAutoFit/>
+          </a:bodyPr>
+          <a:lstStyle/>
+          <a:p>
+            <a:r>
+              <a:rPr lang="en-IE" dirty="0"/>
+              <a:t>18</a:t>
+            </a:r>
+          </a:p>
+        </p:txBody>
+      </p:sp>
+      <p:sp>
+        <p:nvSpPr>
+          <p:cNvPr id="34" name="TextBox 33">
+            <a:extLst>
+              <a:ext uri="{FF2B5EF4-FFF2-40B4-BE49-F238E27FC236}">
+                <a16:creationId xmlns:a16="http://schemas.microsoft.com/office/drawing/2014/main" id="{D528187F-6DAE-4052-A7A9-6FD786F44099}"/>
+              </a:ext>
+            </a:extLst>
+          </p:cNvPr>
+          <p:cNvSpPr txBox="1"/>
+          <p:nvPr/>
+        </p:nvSpPr>
+        <p:spPr>
+          <a:xfrm>
+            <a:off x="7720653" y="4883683"/>
+            <a:ext cx="418704" cy="369332"/>
+          </a:xfrm>
+          <a:prstGeom prst="rect">
+            <a:avLst/>
+          </a:prstGeom>
+          <a:noFill/>
+        </p:spPr>
+        <p:txBody>
+          <a:bodyPr wrap="none" rtlCol="0">
+            <a:spAutoFit/>
+          </a:bodyPr>
+          <a:lstStyle/>
+          <a:p>
+            <a:r>
+              <a:rPr lang="en-IE" dirty="0"/>
+              <a:t>19</a:t>
+            </a:r>
+          </a:p>
+        </p:txBody>
+      </p:sp>
+      <p:sp>
+        <p:nvSpPr>
+          <p:cNvPr id="35" name="TextBox 34">
+            <a:extLst>
+              <a:ext uri="{FF2B5EF4-FFF2-40B4-BE49-F238E27FC236}">
+                <a16:creationId xmlns:a16="http://schemas.microsoft.com/office/drawing/2014/main" id="{E9B0B5BA-AE4A-4BC6-8C60-82C097925858}"/>
+              </a:ext>
+            </a:extLst>
+          </p:cNvPr>
+          <p:cNvSpPr txBox="1"/>
+          <p:nvPr/>
+        </p:nvSpPr>
+        <p:spPr>
+          <a:xfrm>
+            <a:off x="7167598" y="4883683"/>
+            <a:ext cx="418704" cy="369332"/>
+          </a:xfrm>
+          <a:prstGeom prst="rect">
+            <a:avLst/>
+          </a:prstGeom>
+          <a:noFill/>
+        </p:spPr>
+        <p:txBody>
+          <a:bodyPr wrap="none" rtlCol="0">
+            <a:spAutoFit/>
+          </a:bodyPr>
+          <a:lstStyle/>
+          <a:p>
+            <a:r>
+              <a:rPr lang="en-IE" dirty="0"/>
+              <a:t>20</a:t>
+            </a:r>
+          </a:p>
+        </p:txBody>
+      </p:sp>
+      <p:sp>
+        <p:nvSpPr>
+          <p:cNvPr id="37" name="TextBox 36">
+            <a:extLst>
+              <a:ext uri="{FF2B5EF4-FFF2-40B4-BE49-F238E27FC236}">
+                <a16:creationId xmlns:a16="http://schemas.microsoft.com/office/drawing/2014/main" id="{265BC053-40FE-468E-9463-AEA542568C3F}"/>
+              </a:ext>
+            </a:extLst>
+          </p:cNvPr>
+          <p:cNvSpPr txBox="1"/>
+          <p:nvPr/>
+        </p:nvSpPr>
+        <p:spPr>
+          <a:xfrm>
+            <a:off x="7777118" y="5581477"/>
+            <a:ext cx="418704" cy="369332"/>
+          </a:xfrm>
+          <a:prstGeom prst="rect">
+            <a:avLst/>
+          </a:prstGeom>
+          <a:noFill/>
+        </p:spPr>
+        <p:txBody>
+          <a:bodyPr wrap="none" rtlCol="0">
+            <a:spAutoFit/>
+          </a:bodyPr>
+          <a:lstStyle/>
+          <a:p>
+            <a:r>
+              <a:rPr lang="en-IE" dirty="0"/>
+              <a:t>21</a:t>
+            </a:r>
+          </a:p>
+        </p:txBody>
+      </p:sp>
+      <p:sp>
+        <p:nvSpPr>
+          <p:cNvPr id="38" name="TextBox 37">
+            <a:extLst>
+              <a:ext uri="{FF2B5EF4-FFF2-40B4-BE49-F238E27FC236}">
+                <a16:creationId xmlns:a16="http://schemas.microsoft.com/office/drawing/2014/main" id="{4B3BFC04-8FD8-4D6E-9001-974187AD5B6C}"/>
+              </a:ext>
+            </a:extLst>
+          </p:cNvPr>
+          <p:cNvSpPr txBox="1"/>
+          <p:nvPr/>
+        </p:nvSpPr>
+        <p:spPr>
+          <a:xfrm>
+            <a:off x="9492254" y="4883683"/>
+            <a:ext cx="418704" cy="369332"/>
+          </a:xfrm>
+          <a:prstGeom prst="rect">
+            <a:avLst/>
+          </a:prstGeom>
+          <a:noFill/>
+        </p:spPr>
+        <p:txBody>
+          <a:bodyPr wrap="none" rtlCol="0">
+            <a:spAutoFit/>
+          </a:bodyPr>
+          <a:lstStyle/>
+          <a:p>
+            <a:r>
+              <a:rPr lang="en-IE" dirty="0"/>
+              <a:t>22</a:t>
+            </a:r>
+          </a:p>
+        </p:txBody>
+      </p:sp>
+      <p:sp>
+        <p:nvSpPr>
+          <p:cNvPr id="39" name="TextBox 38">
+            <a:extLst>
+              <a:ext uri="{FF2B5EF4-FFF2-40B4-BE49-F238E27FC236}">
+                <a16:creationId xmlns:a16="http://schemas.microsoft.com/office/drawing/2014/main" id="{7EF853C2-93C0-4894-B515-F51E7C2F81FA}"/>
+              </a:ext>
+            </a:extLst>
+          </p:cNvPr>
+          <p:cNvSpPr txBox="1"/>
+          <p:nvPr/>
+        </p:nvSpPr>
+        <p:spPr>
+          <a:xfrm>
+            <a:off x="9503360" y="5581477"/>
+            <a:ext cx="418704" cy="369332"/>
+          </a:xfrm>
+          <a:prstGeom prst="rect">
+            <a:avLst/>
+          </a:prstGeom>
+          <a:noFill/>
+        </p:spPr>
+        <p:txBody>
+          <a:bodyPr wrap="none" rtlCol="0">
+            <a:spAutoFit/>
+          </a:bodyPr>
+          <a:lstStyle/>
+          <a:p>
+            <a:r>
+              <a:rPr lang="en-IE" dirty="0"/>
+              <a:t>23</a:t>
+            </a:r>
+          </a:p>
+        </p:txBody>
+      </p:sp>
+      <p:sp>
+        <p:nvSpPr>
+          <p:cNvPr id="40" name="TextBox 39">
+            <a:extLst>
+              <a:ext uri="{FF2B5EF4-FFF2-40B4-BE49-F238E27FC236}">
+                <a16:creationId xmlns:a16="http://schemas.microsoft.com/office/drawing/2014/main" id="{58C3AEE0-28C8-423B-90AA-3B6F2847D601}"/>
+              </a:ext>
+            </a:extLst>
+          </p:cNvPr>
+          <p:cNvSpPr txBox="1"/>
+          <p:nvPr/>
+        </p:nvSpPr>
+        <p:spPr>
+          <a:xfrm>
+            <a:off x="5241259" y="2460663"/>
+            <a:ext cx="418704" cy="369332"/>
+          </a:xfrm>
+          <a:prstGeom prst="rect">
+            <a:avLst/>
+          </a:prstGeom>
+          <a:noFill/>
+        </p:spPr>
+        <p:txBody>
+          <a:bodyPr wrap="none" rtlCol="0">
+            <a:spAutoFit/>
+          </a:bodyPr>
+          <a:lstStyle/>
+          <a:p>
+            <a:r>
+              <a:rPr lang="en-IE" dirty="0"/>
+              <a:t>24</a:t>
+            </a:r>
+          </a:p>
+        </p:txBody>
+      </p:sp>
+      <p:sp>
+        <p:nvSpPr>
+          <p:cNvPr id="41" name="TextBox 40">
+            <a:extLst>
+              <a:ext uri="{FF2B5EF4-FFF2-40B4-BE49-F238E27FC236}">
+                <a16:creationId xmlns:a16="http://schemas.microsoft.com/office/drawing/2014/main" id="{3767DAA3-B208-4DBC-81CC-217FE1BA81F3}"/>
+              </a:ext>
+            </a:extLst>
+          </p:cNvPr>
+          <p:cNvSpPr txBox="1"/>
+          <p:nvPr/>
+        </p:nvSpPr>
+        <p:spPr>
+          <a:xfrm>
+            <a:off x="4652299" y="2460663"/>
+            <a:ext cx="418704" cy="369332"/>
+          </a:xfrm>
+          <a:prstGeom prst="rect">
+            <a:avLst/>
+          </a:prstGeom>
+          <a:noFill/>
+        </p:spPr>
+        <p:txBody>
+          <a:bodyPr wrap="none" rtlCol="0">
+            <a:spAutoFit/>
+          </a:bodyPr>
+          <a:lstStyle/>
+          <a:p>
+            <a:r>
+              <a:rPr lang="en-IE" dirty="0"/>
+              <a:t>25</a:t>
+            </a:r>
+          </a:p>
+        </p:txBody>
+      </p:sp>
+      <p:sp>
+        <p:nvSpPr>
+          <p:cNvPr id="42" name="TextBox 41">
+            <a:extLst>
+              <a:ext uri="{FF2B5EF4-FFF2-40B4-BE49-F238E27FC236}">
+                <a16:creationId xmlns:a16="http://schemas.microsoft.com/office/drawing/2014/main" id="{D1A4D56D-901B-497A-AF79-5E475E6B3E05}"/>
+              </a:ext>
+            </a:extLst>
+          </p:cNvPr>
+          <p:cNvSpPr txBox="1"/>
+          <p:nvPr/>
+        </p:nvSpPr>
+        <p:spPr>
+          <a:xfrm>
+            <a:off x="4709620" y="4883683"/>
+            <a:ext cx="418704" cy="369332"/>
+          </a:xfrm>
+          <a:prstGeom prst="rect">
+            <a:avLst/>
+          </a:prstGeom>
+          <a:noFill/>
+        </p:spPr>
+        <p:txBody>
+          <a:bodyPr wrap="none" rtlCol="0">
+            <a:spAutoFit/>
+          </a:bodyPr>
+          <a:lstStyle/>
+          <a:p>
+            <a:r>
+              <a:rPr lang="en-IE" dirty="0"/>
+              <a:t>26</a:t>
+            </a:r>
+          </a:p>
+        </p:txBody>
+      </p:sp>
+      <p:sp>
+        <p:nvSpPr>
+          <p:cNvPr id="43" name="TextBox 42">
+            <a:extLst>
+              <a:ext uri="{FF2B5EF4-FFF2-40B4-BE49-F238E27FC236}">
+                <a16:creationId xmlns:a16="http://schemas.microsoft.com/office/drawing/2014/main" id="{F6A9831A-0DC0-4511-B825-B6D0334FA033}"/>
+              </a:ext>
+            </a:extLst>
+          </p:cNvPr>
+          <p:cNvSpPr txBox="1"/>
+          <p:nvPr/>
+        </p:nvSpPr>
+        <p:spPr>
+          <a:xfrm>
+            <a:off x="4700153" y="5648882"/>
+            <a:ext cx="418704" cy="369332"/>
+          </a:xfrm>
+          <a:prstGeom prst="rect">
+            <a:avLst/>
+          </a:prstGeom>
+          <a:noFill/>
+        </p:spPr>
+        <p:txBody>
+          <a:bodyPr wrap="none" rtlCol="0">
+            <a:spAutoFit/>
+          </a:bodyPr>
+          <a:lstStyle/>
+          <a:p>
+            <a:r>
+              <a:rPr lang="en-IE" dirty="0"/>
+              <a:t>27</a:t>
+            </a:r>
+          </a:p>
+        </p:txBody>
+      </p:sp>
+      <p:sp>
+        <p:nvSpPr>
+          <p:cNvPr id="44" name="TextBox 43">
+            <a:extLst>
+              <a:ext uri="{FF2B5EF4-FFF2-40B4-BE49-F238E27FC236}">
+                <a16:creationId xmlns:a16="http://schemas.microsoft.com/office/drawing/2014/main" id="{247930F2-2DCF-4CF2-BEEB-14F8CDA8F4B8}"/>
+              </a:ext>
+            </a:extLst>
+          </p:cNvPr>
+          <p:cNvSpPr txBox="1"/>
+          <p:nvPr/>
+        </p:nvSpPr>
+        <p:spPr>
+          <a:xfrm>
+            <a:off x="4061382" y="6176986"/>
+            <a:ext cx="418704" cy="369332"/>
+          </a:xfrm>
+          <a:prstGeom prst="rect">
+            <a:avLst/>
+          </a:prstGeom>
+          <a:noFill/>
+        </p:spPr>
+        <p:txBody>
+          <a:bodyPr wrap="none" rtlCol="0">
+            <a:spAutoFit/>
+          </a:bodyPr>
+          <a:lstStyle/>
+          <a:p>
+            <a:r>
+              <a:rPr lang="en-IE" dirty="0"/>
+              <a:t>28</a:t>
+            </a:r>
+          </a:p>
+        </p:txBody>
+      </p:sp>
+      <p:sp>
+        <p:nvSpPr>
+          <p:cNvPr id="45" name="TextBox 44">
+            <a:extLst>
+              <a:ext uri="{FF2B5EF4-FFF2-40B4-BE49-F238E27FC236}">
+                <a16:creationId xmlns:a16="http://schemas.microsoft.com/office/drawing/2014/main" id="{61F568B0-5CCC-4416-87F6-E256B7670284}"/>
+              </a:ext>
+            </a:extLst>
+          </p:cNvPr>
+          <p:cNvSpPr txBox="1"/>
+          <p:nvPr/>
+        </p:nvSpPr>
+        <p:spPr>
+          <a:xfrm>
+            <a:off x="3415232" y="6242701"/>
+            <a:ext cx="418704" cy="369332"/>
+          </a:xfrm>
+          <a:prstGeom prst="rect">
+            <a:avLst/>
+          </a:prstGeom>
+          <a:noFill/>
+        </p:spPr>
+        <p:txBody>
+          <a:bodyPr wrap="none" rtlCol="0">
+            <a:spAutoFit/>
+          </a:bodyPr>
+          <a:lstStyle/>
+          <a:p>
+            <a:r>
+              <a:rPr lang="en-IE" dirty="0"/>
+              <a:t>29</a:t>
+            </a:r>
+          </a:p>
+        </p:txBody>
+      </p:sp>
+      <p:sp>
+        <p:nvSpPr>
+          <p:cNvPr id="46" name="TextBox 45">
+            <a:extLst>
+              <a:ext uri="{FF2B5EF4-FFF2-40B4-BE49-F238E27FC236}">
+                <a16:creationId xmlns:a16="http://schemas.microsoft.com/office/drawing/2014/main" id="{C1A906DF-63F4-44AA-A166-0408E7940633}"/>
+              </a:ext>
+            </a:extLst>
+          </p:cNvPr>
+          <p:cNvSpPr txBox="1"/>
+          <p:nvPr/>
+        </p:nvSpPr>
+        <p:spPr>
+          <a:xfrm>
+            <a:off x="1661118" y="6176986"/>
+            <a:ext cx="418704" cy="369332"/>
+          </a:xfrm>
+          <a:prstGeom prst="rect">
+            <a:avLst/>
+          </a:prstGeom>
+          <a:noFill/>
+        </p:spPr>
+        <p:txBody>
+          <a:bodyPr wrap="none" rtlCol="0">
+            <a:spAutoFit/>
+          </a:bodyPr>
+          <a:lstStyle/>
+          <a:p>
+            <a:r>
+              <a:rPr lang="en-IE" dirty="0"/>
+              <a:t>30</a:t>
+            </a:r>
+          </a:p>
+        </p:txBody>
+      </p:sp>
+      <p:sp>
+        <p:nvSpPr>
+          <p:cNvPr id="47" name="TextBox 46">
+            <a:extLst>
+              <a:ext uri="{FF2B5EF4-FFF2-40B4-BE49-F238E27FC236}">
+                <a16:creationId xmlns:a16="http://schemas.microsoft.com/office/drawing/2014/main" id="{144E04C8-1454-478B-AB19-01E4CE4F7DF5}"/>
+              </a:ext>
+            </a:extLst>
+          </p:cNvPr>
+          <p:cNvSpPr txBox="1"/>
+          <p:nvPr/>
+        </p:nvSpPr>
+        <p:spPr>
+          <a:xfrm>
+            <a:off x="1030653" y="5581477"/>
+            <a:ext cx="418704" cy="369332"/>
+          </a:xfrm>
+          <a:prstGeom prst="rect">
+            <a:avLst/>
+          </a:prstGeom>
+          <a:noFill/>
+        </p:spPr>
+        <p:txBody>
+          <a:bodyPr wrap="none" rtlCol="0">
+            <a:spAutoFit/>
+          </a:bodyPr>
+          <a:lstStyle/>
+          <a:p>
+            <a:r>
+              <a:rPr lang="en-IE" dirty="0"/>
+              <a:t>31</a:t>
+            </a:r>
+          </a:p>
+        </p:txBody>
+      </p:sp>
+      <p:sp>
+        <p:nvSpPr>
+          <p:cNvPr id="48" name="TextBox 47">
+            <a:extLst>
+              <a:ext uri="{FF2B5EF4-FFF2-40B4-BE49-F238E27FC236}">
+                <a16:creationId xmlns:a16="http://schemas.microsoft.com/office/drawing/2014/main" id="{CE125C6F-DA4D-497C-8048-21D9968B050E}"/>
+              </a:ext>
+            </a:extLst>
+          </p:cNvPr>
+          <p:cNvSpPr txBox="1"/>
+          <p:nvPr/>
+        </p:nvSpPr>
+        <p:spPr>
+          <a:xfrm>
+            <a:off x="1015763" y="4883683"/>
+            <a:ext cx="418704" cy="369332"/>
+          </a:xfrm>
+          <a:prstGeom prst="rect">
+            <a:avLst/>
+          </a:prstGeom>
+          <a:noFill/>
+        </p:spPr>
+        <p:txBody>
+          <a:bodyPr wrap="none" rtlCol="0">
+            <a:spAutoFit/>
+          </a:bodyPr>
+          <a:lstStyle/>
+          <a:p>
+            <a:r>
+              <a:rPr lang="en-IE" dirty="0"/>
+              <a:t>32</a:t>
+            </a:r>
+          </a:p>
+        </p:txBody>
+      </p:sp>
+      <p:sp>
+        <p:nvSpPr>
+          <p:cNvPr id="49" name="TextBox 48">
+            <a:extLst>
+              <a:ext uri="{FF2B5EF4-FFF2-40B4-BE49-F238E27FC236}">
+                <a16:creationId xmlns:a16="http://schemas.microsoft.com/office/drawing/2014/main" id="{BBA2FDEF-0092-41B9-85A4-5B2A6BD1F729}"/>
+              </a:ext>
+            </a:extLst>
+          </p:cNvPr>
+          <p:cNvSpPr txBox="1"/>
+          <p:nvPr/>
+        </p:nvSpPr>
+        <p:spPr>
+          <a:xfrm>
+            <a:off x="1648105" y="4317774"/>
+            <a:ext cx="418704" cy="369332"/>
+          </a:xfrm>
+          <a:prstGeom prst="rect">
+            <a:avLst/>
+          </a:prstGeom>
+          <a:noFill/>
+        </p:spPr>
+        <p:txBody>
+          <a:bodyPr wrap="none" rtlCol="0">
+            <a:spAutoFit/>
+          </a:bodyPr>
+          <a:lstStyle/>
+          <a:p>
+            <a:r>
+              <a:rPr lang="en-IE" dirty="0"/>
+              <a:t>33</a:t>
+            </a:r>
+          </a:p>
+        </p:txBody>
+      </p:sp>
+      <p:sp>
+        <p:nvSpPr>
+          <p:cNvPr id="50" name="TextBox 49">
+            <a:extLst>
+              <a:ext uri="{FF2B5EF4-FFF2-40B4-BE49-F238E27FC236}">
+                <a16:creationId xmlns:a16="http://schemas.microsoft.com/office/drawing/2014/main" id="{BFD3F739-CFA9-4F4D-A80B-75EC01D413D0}"/>
+              </a:ext>
+            </a:extLst>
+          </p:cNvPr>
+          <p:cNvSpPr txBox="1"/>
+          <p:nvPr/>
+        </p:nvSpPr>
+        <p:spPr>
+          <a:xfrm>
+            <a:off x="2836975" y="4296802"/>
+            <a:ext cx="418704" cy="369332"/>
+          </a:xfrm>
+          <a:prstGeom prst="rect">
+            <a:avLst/>
+          </a:prstGeom>
+          <a:noFill/>
+        </p:spPr>
+        <p:txBody>
+          <a:bodyPr wrap="none" rtlCol="0">
+            <a:spAutoFit/>
+          </a:bodyPr>
+          <a:lstStyle/>
+          <a:p>
+            <a:r>
+              <a:rPr lang="en-IE" dirty="0"/>
+              <a:t>34</a:t>
+            </a:r>
+          </a:p>
+        </p:txBody>
+      </p:sp>
+      <p:sp>
+        <p:nvSpPr>
+          <p:cNvPr id="51" name="TextBox 50">
+            <a:extLst>
+              <a:ext uri="{FF2B5EF4-FFF2-40B4-BE49-F238E27FC236}">
+                <a16:creationId xmlns:a16="http://schemas.microsoft.com/office/drawing/2014/main" id="{69798D24-B9D9-4B7C-A10B-D909D2976D47}"/>
+              </a:ext>
+            </a:extLst>
+          </p:cNvPr>
+          <p:cNvSpPr txBox="1"/>
+          <p:nvPr/>
+        </p:nvSpPr>
+        <p:spPr>
+          <a:xfrm>
+            <a:off x="2836975" y="2460663"/>
+            <a:ext cx="418704" cy="369332"/>
+          </a:xfrm>
+          <a:prstGeom prst="rect">
+            <a:avLst/>
+          </a:prstGeom>
+          <a:noFill/>
+        </p:spPr>
+        <p:txBody>
+          <a:bodyPr wrap="none" rtlCol="0">
+            <a:spAutoFit/>
+          </a:bodyPr>
+          <a:lstStyle/>
+          <a:p>
+            <a:r>
+              <a:rPr lang="en-IE" dirty="0"/>
+              <a:t>35</a:t>
+            </a:r>
+          </a:p>
+        </p:txBody>
+      </p:sp>
+      <p:sp>
+        <p:nvSpPr>
+          <p:cNvPr id="52" name="TextBox 51">
+            <a:extLst>
+              <a:ext uri="{FF2B5EF4-FFF2-40B4-BE49-F238E27FC236}">
+                <a16:creationId xmlns:a16="http://schemas.microsoft.com/office/drawing/2014/main" id="{9B2EED6E-6CFA-4BF3-B842-1B7989A857B0}"/>
+              </a:ext>
+            </a:extLst>
+          </p:cNvPr>
+          <p:cNvSpPr txBox="1"/>
+          <p:nvPr/>
+        </p:nvSpPr>
+        <p:spPr>
+          <a:xfrm>
+            <a:off x="2289709" y="2460663"/>
+            <a:ext cx="418704" cy="369332"/>
+          </a:xfrm>
+          <a:prstGeom prst="rect">
+            <a:avLst/>
+          </a:prstGeom>
+          <a:noFill/>
+        </p:spPr>
+        <p:txBody>
+          <a:bodyPr wrap="none" rtlCol="0">
+            <a:spAutoFit/>
+          </a:bodyPr>
+          <a:lstStyle/>
+          <a:p>
+            <a:r>
+              <a:rPr lang="en-IE" dirty="0"/>
+              <a:t>36</a:t>
+            </a:r>
+          </a:p>
+        </p:txBody>
+      </p:sp>
+      <p:sp>
+        <p:nvSpPr>
+          <p:cNvPr id="53" name="TextBox 52">
+            <a:extLst>
+              <a:ext uri="{FF2B5EF4-FFF2-40B4-BE49-F238E27FC236}">
+                <a16:creationId xmlns:a16="http://schemas.microsoft.com/office/drawing/2014/main" id="{3074C8F7-02C2-477E-AEA7-3D37A68297B7}"/>
+              </a:ext>
+            </a:extLst>
+          </p:cNvPr>
+          <p:cNvSpPr txBox="1"/>
+          <p:nvPr/>
+        </p:nvSpPr>
+        <p:spPr>
+          <a:xfrm>
+            <a:off x="1644579" y="1838480"/>
+            <a:ext cx="418704" cy="369332"/>
+          </a:xfrm>
+          <a:prstGeom prst="rect">
+            <a:avLst/>
+          </a:prstGeom>
+          <a:noFill/>
+        </p:spPr>
+        <p:txBody>
+          <a:bodyPr wrap="none" rtlCol="0">
+            <a:spAutoFit/>
+          </a:bodyPr>
+          <a:lstStyle/>
+          <a:p>
+            <a:r>
+              <a:rPr lang="en-IE" dirty="0"/>
+              <a:t>37</a:t>
+            </a:r>
+          </a:p>
+        </p:txBody>
+      </p:sp>
+      <p:sp>
+        <p:nvSpPr>
+          <p:cNvPr id="54" name="TextBox 53">
+            <a:extLst>
+              <a:ext uri="{FF2B5EF4-FFF2-40B4-BE49-F238E27FC236}">
+                <a16:creationId xmlns:a16="http://schemas.microsoft.com/office/drawing/2014/main" id="{6415A19F-28EF-4F22-A249-9ED97EFEF4F3}"/>
+              </a:ext>
+            </a:extLst>
+          </p:cNvPr>
+          <p:cNvSpPr txBox="1"/>
+          <p:nvPr/>
+        </p:nvSpPr>
+        <p:spPr>
+          <a:xfrm>
+            <a:off x="1622617" y="1190389"/>
+            <a:ext cx="418704" cy="369332"/>
+          </a:xfrm>
+          <a:prstGeom prst="rect">
+            <a:avLst/>
+          </a:prstGeom>
+          <a:noFill/>
+        </p:spPr>
+        <p:txBody>
+          <a:bodyPr wrap="none" rtlCol="0">
+            <a:spAutoFit/>
+          </a:bodyPr>
+          <a:lstStyle/>
+          <a:p>
+            <a:r>
+              <a:rPr lang="en-IE" dirty="0"/>
+              <a:t>38</a:t>
+            </a:r>
+          </a:p>
+        </p:txBody>
+      </p:sp>
+      <p:sp>
+        <p:nvSpPr>
+          <p:cNvPr id="55" name="TextBox 54">
+            <a:extLst>
+              <a:ext uri="{FF2B5EF4-FFF2-40B4-BE49-F238E27FC236}">
+                <a16:creationId xmlns:a16="http://schemas.microsoft.com/office/drawing/2014/main" id="{2BC340BB-2B52-4143-B797-F3B2BEC613D2}"/>
+              </a:ext>
+            </a:extLst>
+          </p:cNvPr>
+          <p:cNvSpPr txBox="1"/>
+          <p:nvPr/>
+        </p:nvSpPr>
+        <p:spPr>
+          <a:xfrm>
+            <a:off x="2339181" y="568945"/>
+            <a:ext cx="418704" cy="369332"/>
+          </a:xfrm>
+          <a:prstGeom prst="rect">
+            <a:avLst/>
+          </a:prstGeom>
+          <a:noFill/>
+        </p:spPr>
+        <p:txBody>
+          <a:bodyPr wrap="none" rtlCol="0">
+            <a:spAutoFit/>
+          </a:bodyPr>
+          <a:lstStyle/>
+          <a:p>
+            <a:r>
+              <a:rPr lang="en-IE" dirty="0"/>
+              <a:t>39</a:t>
+            </a:r>
+          </a:p>
+        </p:txBody>
+      </p:sp>
+      <p:sp>
+        <p:nvSpPr>
+          <p:cNvPr id="56" name="TextBox 55">
+            <a:extLst>
+              <a:ext uri="{FF2B5EF4-FFF2-40B4-BE49-F238E27FC236}">
+                <a16:creationId xmlns:a16="http://schemas.microsoft.com/office/drawing/2014/main" id="{C652B3B1-4D21-42F6-A3A6-C134381A4CF4}"/>
+              </a:ext>
+            </a:extLst>
+          </p:cNvPr>
+          <p:cNvSpPr txBox="1"/>
+          <p:nvPr/>
+        </p:nvSpPr>
+        <p:spPr>
+          <a:xfrm>
+            <a:off x="5241259" y="678111"/>
+            <a:ext cx="418704" cy="369332"/>
+          </a:xfrm>
+          <a:prstGeom prst="rect">
+            <a:avLst/>
+          </a:prstGeom>
+          <a:noFill/>
+        </p:spPr>
+        <p:txBody>
+          <a:bodyPr wrap="none" rtlCol="0">
+            <a:spAutoFit/>
+          </a:bodyPr>
+          <a:lstStyle/>
+          <a:p>
+            <a:r>
+              <a:rPr lang="en-IE" dirty="0"/>
+              <a:t>40</a:t>
+            </a:r>
+          </a:p>
+        </p:txBody>
+      </p:sp>
+    </p:spTree>
+    <p:extLst>
+      <p:ext uri="{BB962C8B-B14F-4D97-AF65-F5344CB8AC3E}">
+        <p14:creationId xmlns:p14="http://schemas.microsoft.com/office/powerpoint/2010/main" val="341406672"/>
+      </p:ext>
+    </p:extLst>
+  </p:cSld>
+  <p:clrMapOvr>
+    <a:masterClrMapping/>
+  </p:clrMapOvr>
+</p:sld>
+</file>
+
+<file path=ppt/slides/slide8.xml><?xml version="1.0" encoding="utf-8"?>
+<p:sld xmlns:a="http://schemas.openxmlformats.org/drawingml/2006/main" xmlns:r="http://schemas.openxmlformats.org/officeDocument/2006/relationships" xmlns:p="http://schemas.openxmlformats.org/presentationml/2006/main">
+  <p:cSld>
+    <p:spTree>
+      <p:nvGrpSpPr>
+        <p:cNvPr id="1" name=""/>
+        <p:cNvGrpSpPr/>
+        <p:nvPr/>
+      </p:nvGrpSpPr>
+      <p:grpSpPr>
+        <a:xfrm>
+          <a:off x="0" y="0"/>
+          <a:ext cx="0" cy="0"/>
+          <a:chOff x="0" y="0"/>
+          <a:chExt cx="0" cy="0"/>
+        </a:xfrm>
+      </p:grpSpPr>
+      <p:pic>
+        <p:nvPicPr>
+          <p:cNvPr id="3" name="Picture 2">
+            <a:extLst>
+              <a:ext uri="{FF2B5EF4-FFF2-40B4-BE49-F238E27FC236}">
+                <a16:creationId xmlns:a16="http://schemas.microsoft.com/office/drawing/2014/main" id="{83441F0F-CE5F-43E0-B269-DDFAA7A69100}"/>
+              </a:ext>
+            </a:extLst>
+          </p:cNvPr>
+          <p:cNvPicPr>
+            <a:picLocks noChangeAspect="1"/>
+          </p:cNvPicPr>
+          <p:nvPr/>
+        </p:nvPicPr>
+        <p:blipFill>
+          <a:blip r:embed="rId2">
+            <a:extLst>
+              <a:ext uri="{28A0092B-C50C-407E-A947-70E740481C1C}">
+                <a14:useLocalDpi xmlns:a14="http://schemas.microsoft.com/office/drawing/2010/main" val="0"/>
+              </a:ext>
+            </a:extLst>
+          </a:blip>
+          <a:stretch>
+            <a:fillRect/>
+          </a:stretch>
+        </p:blipFill>
+        <p:spPr>
+          <a:xfrm>
+            <a:off x="1174459" y="167779"/>
+            <a:ext cx="8669323" cy="8669323"/>
+          </a:xfrm>
+          <a:prstGeom prst="rect">
+            <a:avLst/>
+          </a:prstGeom>
+        </p:spPr>
+      </p:pic>
+      <p:sp>
+        <p:nvSpPr>
+          <p:cNvPr id="15" name="TextBox 14">
+            <a:extLst>
+              <a:ext uri="{FF2B5EF4-FFF2-40B4-BE49-F238E27FC236}">
+                <a16:creationId xmlns:a16="http://schemas.microsoft.com/office/drawing/2014/main" id="{C2023A06-198B-4D61-A7CE-8A2B8F9CB8AC}"/>
+              </a:ext>
+            </a:extLst>
+          </p:cNvPr>
+          <p:cNvSpPr txBox="1"/>
+          <p:nvPr/>
+        </p:nvSpPr>
+        <p:spPr>
+          <a:xfrm>
+            <a:off x="2348218" y="1174351"/>
+            <a:ext cx="301686" cy="369332"/>
+          </a:xfrm>
+          <a:prstGeom prst="rect">
+            <a:avLst/>
+          </a:prstGeom>
+          <a:noFill/>
+        </p:spPr>
+        <p:txBody>
+          <a:bodyPr wrap="none" rtlCol="0">
+            <a:spAutoFit/>
+          </a:bodyPr>
+          <a:lstStyle/>
+          <a:p>
+            <a:r>
+              <a:rPr lang="en-IE" dirty="0"/>
+              <a:t>1</a:t>
+            </a:r>
+          </a:p>
+        </p:txBody>
+      </p:sp>
+      <p:sp>
+        <p:nvSpPr>
+          <p:cNvPr id="16" name="TextBox 15">
+            <a:extLst>
+              <a:ext uri="{FF2B5EF4-FFF2-40B4-BE49-F238E27FC236}">
+                <a16:creationId xmlns:a16="http://schemas.microsoft.com/office/drawing/2014/main" id="{9573BFA1-9C77-437B-97C1-9E56F2100013}"/>
+              </a:ext>
+            </a:extLst>
+          </p:cNvPr>
+          <p:cNvSpPr txBox="1"/>
+          <p:nvPr/>
+        </p:nvSpPr>
+        <p:spPr>
+          <a:xfrm>
+            <a:off x="5358277" y="1174351"/>
+            <a:ext cx="301686" cy="369332"/>
+          </a:xfrm>
+          <a:prstGeom prst="rect">
+            <a:avLst/>
+          </a:prstGeom>
+          <a:noFill/>
+        </p:spPr>
+        <p:txBody>
+          <a:bodyPr wrap="none" rtlCol="0">
+            <a:spAutoFit/>
+          </a:bodyPr>
+          <a:lstStyle/>
+          <a:p>
+            <a:r>
+              <a:rPr lang="en-IE" dirty="0"/>
+              <a:t>2</a:t>
+            </a:r>
+          </a:p>
+        </p:txBody>
+      </p:sp>
+      <p:sp>
+        <p:nvSpPr>
+          <p:cNvPr id="17" name="TextBox 16">
+            <a:extLst>
+              <a:ext uri="{FF2B5EF4-FFF2-40B4-BE49-F238E27FC236}">
+                <a16:creationId xmlns:a16="http://schemas.microsoft.com/office/drawing/2014/main" id="{1765F4FA-CD65-4C2B-8F22-3F7EE69285F3}"/>
+              </a:ext>
+            </a:extLst>
+          </p:cNvPr>
+          <p:cNvSpPr txBox="1"/>
+          <p:nvPr/>
+        </p:nvSpPr>
+        <p:spPr>
+          <a:xfrm>
+            <a:off x="2348218" y="1779757"/>
+            <a:ext cx="301686" cy="369332"/>
+          </a:xfrm>
+          <a:prstGeom prst="rect">
+            <a:avLst/>
+          </a:prstGeom>
+          <a:noFill/>
+        </p:spPr>
+        <p:txBody>
+          <a:bodyPr wrap="none" rtlCol="0">
+            <a:spAutoFit/>
+          </a:bodyPr>
+          <a:lstStyle/>
+          <a:p>
+            <a:r>
+              <a:rPr lang="en-IE" dirty="0"/>
+              <a:t>3</a:t>
+            </a:r>
+          </a:p>
+        </p:txBody>
+      </p:sp>
+      <p:sp>
+        <p:nvSpPr>
+          <p:cNvPr id="18" name="TextBox 17">
+            <a:extLst>
+              <a:ext uri="{FF2B5EF4-FFF2-40B4-BE49-F238E27FC236}">
+                <a16:creationId xmlns:a16="http://schemas.microsoft.com/office/drawing/2014/main" id="{75A6E180-E1E2-4289-B6BC-C6CDFDAC5335}"/>
+              </a:ext>
+            </a:extLst>
+          </p:cNvPr>
+          <p:cNvSpPr txBox="1"/>
+          <p:nvPr/>
+        </p:nvSpPr>
+        <p:spPr>
+          <a:xfrm>
+            <a:off x="5358277" y="1779757"/>
+            <a:ext cx="301686" cy="369332"/>
+          </a:xfrm>
+          <a:prstGeom prst="rect">
+            <a:avLst/>
+          </a:prstGeom>
+          <a:noFill/>
+        </p:spPr>
+        <p:txBody>
+          <a:bodyPr wrap="none" rtlCol="0">
+            <a:spAutoFit/>
+          </a:bodyPr>
+          <a:lstStyle/>
+          <a:p>
+            <a:r>
+              <a:rPr lang="en-IE" dirty="0"/>
+              <a:t>4</a:t>
+            </a:r>
+          </a:p>
+        </p:txBody>
+      </p:sp>
+      <p:sp>
+        <p:nvSpPr>
+          <p:cNvPr id="19" name="TextBox 18">
+            <a:extLst>
+              <a:ext uri="{FF2B5EF4-FFF2-40B4-BE49-F238E27FC236}">
+                <a16:creationId xmlns:a16="http://schemas.microsoft.com/office/drawing/2014/main" id="{81A6FC59-0601-46FF-A797-63E5AC6E731E}"/>
+              </a:ext>
+            </a:extLst>
+          </p:cNvPr>
+          <p:cNvSpPr txBox="1"/>
+          <p:nvPr/>
+        </p:nvSpPr>
+        <p:spPr>
+          <a:xfrm>
+            <a:off x="3551561" y="1838480"/>
+            <a:ext cx="301686" cy="369332"/>
+          </a:xfrm>
+          <a:prstGeom prst="rect">
+            <a:avLst/>
+          </a:prstGeom>
+          <a:noFill/>
+        </p:spPr>
+        <p:txBody>
+          <a:bodyPr wrap="none" rtlCol="0">
+            <a:spAutoFit/>
+          </a:bodyPr>
+          <a:lstStyle/>
+          <a:p>
+            <a:r>
+              <a:rPr lang="en-IE" dirty="0"/>
+              <a:t>5</a:t>
+            </a:r>
+          </a:p>
+        </p:txBody>
+      </p:sp>
+      <p:sp>
+        <p:nvSpPr>
+          <p:cNvPr id="20" name="TextBox 19">
+            <a:extLst>
+              <a:ext uri="{FF2B5EF4-FFF2-40B4-BE49-F238E27FC236}">
+                <a16:creationId xmlns:a16="http://schemas.microsoft.com/office/drawing/2014/main" id="{DCE8BB59-0BA3-412E-B918-63D0614E3D48}"/>
+              </a:ext>
+            </a:extLst>
+          </p:cNvPr>
+          <p:cNvSpPr txBox="1"/>
+          <p:nvPr/>
+        </p:nvSpPr>
+        <p:spPr>
+          <a:xfrm>
+            <a:off x="4153233" y="1779757"/>
+            <a:ext cx="301686" cy="369332"/>
+          </a:xfrm>
+          <a:prstGeom prst="rect">
+            <a:avLst/>
+          </a:prstGeom>
+          <a:noFill/>
+        </p:spPr>
+        <p:txBody>
+          <a:bodyPr wrap="none" rtlCol="0">
+            <a:spAutoFit/>
+          </a:bodyPr>
+          <a:lstStyle/>
+          <a:p>
+            <a:r>
+              <a:rPr lang="en-IE" dirty="0"/>
+              <a:t>6</a:t>
+            </a:r>
+          </a:p>
+        </p:txBody>
+      </p:sp>
+      <p:sp>
+        <p:nvSpPr>
+          <p:cNvPr id="21" name="TextBox 20">
+            <a:extLst>
+              <a:ext uri="{FF2B5EF4-FFF2-40B4-BE49-F238E27FC236}">
+                <a16:creationId xmlns:a16="http://schemas.microsoft.com/office/drawing/2014/main" id="{FDE83407-C4AB-4C5C-BFCE-FC405DFEE12B}"/>
+              </a:ext>
+            </a:extLst>
+          </p:cNvPr>
+          <p:cNvSpPr txBox="1"/>
+          <p:nvPr/>
+        </p:nvSpPr>
+        <p:spPr>
+          <a:xfrm>
+            <a:off x="3473741" y="4883683"/>
+            <a:ext cx="301686" cy="369332"/>
+          </a:xfrm>
+          <a:prstGeom prst="rect">
+            <a:avLst/>
+          </a:prstGeom>
+          <a:noFill/>
+        </p:spPr>
+        <p:txBody>
+          <a:bodyPr wrap="none" rtlCol="0">
+            <a:spAutoFit/>
+          </a:bodyPr>
+          <a:lstStyle/>
+          <a:p>
+            <a:r>
+              <a:rPr lang="en-IE" dirty="0"/>
+              <a:t>7</a:t>
+            </a:r>
+          </a:p>
+        </p:txBody>
+      </p:sp>
+      <p:sp>
+        <p:nvSpPr>
+          <p:cNvPr id="22" name="TextBox 21">
+            <a:extLst>
+              <a:ext uri="{FF2B5EF4-FFF2-40B4-BE49-F238E27FC236}">
+                <a16:creationId xmlns:a16="http://schemas.microsoft.com/office/drawing/2014/main" id="{C2D55637-537A-4788-8CA9-03E4E45BCFD2}"/>
+              </a:ext>
+            </a:extLst>
+          </p:cNvPr>
+          <p:cNvSpPr txBox="1"/>
+          <p:nvPr/>
+        </p:nvSpPr>
+        <p:spPr>
+          <a:xfrm>
+            <a:off x="4153233" y="4883683"/>
+            <a:ext cx="301686" cy="369332"/>
+          </a:xfrm>
+          <a:prstGeom prst="rect">
+            <a:avLst/>
+          </a:prstGeom>
+          <a:noFill/>
+        </p:spPr>
+        <p:txBody>
+          <a:bodyPr wrap="none" rtlCol="0">
+            <a:spAutoFit/>
+          </a:bodyPr>
+          <a:lstStyle/>
+          <a:p>
+            <a:r>
+              <a:rPr lang="en-IE" dirty="0"/>
+              <a:t>8</a:t>
+            </a:r>
+          </a:p>
+        </p:txBody>
+      </p:sp>
+      <p:sp>
+        <p:nvSpPr>
+          <p:cNvPr id="23" name="TextBox 22">
+            <a:extLst>
+              <a:ext uri="{FF2B5EF4-FFF2-40B4-BE49-F238E27FC236}">
+                <a16:creationId xmlns:a16="http://schemas.microsoft.com/office/drawing/2014/main" id="{5FDB87AB-2739-40FD-8B4C-D4EDE28595A9}"/>
+              </a:ext>
+            </a:extLst>
+          </p:cNvPr>
+          <p:cNvSpPr txBox="1"/>
+          <p:nvPr/>
+        </p:nvSpPr>
+        <p:spPr>
+          <a:xfrm>
+            <a:off x="3551561" y="5563192"/>
+            <a:ext cx="418704" cy="369332"/>
+          </a:xfrm>
+          <a:prstGeom prst="rect">
+            <a:avLst/>
+          </a:prstGeom>
+          <a:noFill/>
+        </p:spPr>
+        <p:txBody>
+          <a:bodyPr wrap="none" rtlCol="0">
+            <a:spAutoFit/>
+          </a:bodyPr>
+          <a:lstStyle/>
+          <a:p>
+            <a:r>
+              <a:rPr lang="en-IE" dirty="0"/>
+              <a:t>19</a:t>
+            </a:r>
+          </a:p>
+        </p:txBody>
+      </p:sp>
+      <p:sp>
+        <p:nvSpPr>
+          <p:cNvPr id="24" name="TextBox 23">
+            <a:extLst>
+              <a:ext uri="{FF2B5EF4-FFF2-40B4-BE49-F238E27FC236}">
+                <a16:creationId xmlns:a16="http://schemas.microsoft.com/office/drawing/2014/main" id="{ED985B89-D7A3-4B8D-85E8-E68D4969478E}"/>
+              </a:ext>
+            </a:extLst>
+          </p:cNvPr>
+          <p:cNvSpPr txBox="1"/>
+          <p:nvPr/>
+        </p:nvSpPr>
+        <p:spPr>
+          <a:xfrm>
+            <a:off x="1803632" y="4883683"/>
+            <a:ext cx="444617" cy="369332"/>
+          </a:xfrm>
+          <a:prstGeom prst="rect">
+            <a:avLst/>
+          </a:prstGeom>
+          <a:noFill/>
+        </p:spPr>
+        <p:txBody>
+          <a:bodyPr wrap="square" rtlCol="0">
+            <a:spAutoFit/>
+          </a:bodyPr>
+          <a:lstStyle/>
+          <a:p>
+            <a:r>
+              <a:rPr lang="en-IE" dirty="0"/>
+              <a:t>10</a:t>
+            </a:r>
+          </a:p>
+        </p:txBody>
+      </p:sp>
+      <p:sp>
+        <p:nvSpPr>
+          <p:cNvPr id="25" name="TextBox 24">
+            <a:extLst>
+              <a:ext uri="{FF2B5EF4-FFF2-40B4-BE49-F238E27FC236}">
+                <a16:creationId xmlns:a16="http://schemas.microsoft.com/office/drawing/2014/main" id="{C4645D5D-20B6-49CF-BD55-97E4BC7FFE0B}"/>
+              </a:ext>
+            </a:extLst>
+          </p:cNvPr>
+          <p:cNvSpPr txBox="1"/>
+          <p:nvPr/>
+        </p:nvSpPr>
+        <p:spPr>
+          <a:xfrm>
+            <a:off x="1724254" y="5504469"/>
+            <a:ext cx="418704" cy="369332"/>
+          </a:xfrm>
+          <a:prstGeom prst="rect">
+            <a:avLst/>
+          </a:prstGeom>
+          <a:noFill/>
+        </p:spPr>
+        <p:txBody>
+          <a:bodyPr wrap="none" rtlCol="0">
+            <a:spAutoFit/>
+          </a:bodyPr>
+          <a:lstStyle/>
+          <a:p>
+            <a:r>
+              <a:rPr lang="en-IE" dirty="0"/>
+              <a:t>11</a:t>
+            </a:r>
+          </a:p>
+        </p:txBody>
+      </p:sp>
+      <p:sp>
+        <p:nvSpPr>
+          <p:cNvPr id="26" name="TextBox 25">
+            <a:extLst>
+              <a:ext uri="{FF2B5EF4-FFF2-40B4-BE49-F238E27FC236}">
+                <a16:creationId xmlns:a16="http://schemas.microsoft.com/office/drawing/2014/main" id="{8A57D660-49D9-4D7D-9DC5-69CA6F1B5239}"/>
+              </a:ext>
+            </a:extLst>
+          </p:cNvPr>
+          <p:cNvSpPr txBox="1"/>
+          <p:nvPr/>
+        </p:nvSpPr>
+        <p:spPr>
+          <a:xfrm>
+            <a:off x="3610070" y="3630523"/>
+            <a:ext cx="301686" cy="369332"/>
+          </a:xfrm>
+          <a:prstGeom prst="rect">
+            <a:avLst/>
+          </a:prstGeom>
+          <a:noFill/>
+        </p:spPr>
+        <p:txBody>
+          <a:bodyPr wrap="none" rtlCol="0">
+            <a:spAutoFit/>
+          </a:bodyPr>
+          <a:lstStyle/>
+          <a:p>
+            <a:r>
+              <a:rPr lang="en-IE" dirty="0"/>
+              <a:t>0</a:t>
+            </a:r>
+          </a:p>
+        </p:txBody>
+      </p:sp>
+      <p:sp>
+        <p:nvSpPr>
+          <p:cNvPr id="27" name="TextBox 26">
+            <a:extLst>
+              <a:ext uri="{FF2B5EF4-FFF2-40B4-BE49-F238E27FC236}">
+                <a16:creationId xmlns:a16="http://schemas.microsoft.com/office/drawing/2014/main" id="{5761A7C4-8C1E-446F-8A5A-20DD4E649494}"/>
+              </a:ext>
+            </a:extLst>
+          </p:cNvPr>
+          <p:cNvSpPr txBox="1"/>
+          <p:nvPr/>
+        </p:nvSpPr>
+        <p:spPr>
+          <a:xfrm>
+            <a:off x="7735348" y="3692447"/>
+            <a:ext cx="418704" cy="369332"/>
+          </a:xfrm>
+          <a:prstGeom prst="rect">
+            <a:avLst/>
+          </a:prstGeom>
+          <a:noFill/>
+        </p:spPr>
+        <p:txBody>
+          <a:bodyPr wrap="none" rtlCol="0">
+            <a:spAutoFit/>
+          </a:bodyPr>
+          <a:lstStyle/>
+          <a:p>
+            <a:r>
+              <a:rPr lang="en-IE" dirty="0"/>
+              <a:t>12</a:t>
+            </a:r>
+          </a:p>
+        </p:txBody>
+      </p:sp>
+      <p:sp>
+        <p:nvSpPr>
+          <p:cNvPr id="28" name="TextBox 27">
+            <a:extLst>
+              <a:ext uri="{FF2B5EF4-FFF2-40B4-BE49-F238E27FC236}">
+                <a16:creationId xmlns:a16="http://schemas.microsoft.com/office/drawing/2014/main" id="{BB733A21-2F32-4884-B899-3A6D47DE28A8}"/>
+              </a:ext>
+            </a:extLst>
+          </p:cNvPr>
+          <p:cNvSpPr txBox="1"/>
+          <p:nvPr/>
+        </p:nvSpPr>
+        <p:spPr>
+          <a:xfrm>
+            <a:off x="8976919" y="1174351"/>
+            <a:ext cx="418704" cy="369332"/>
+          </a:xfrm>
+          <a:prstGeom prst="rect">
+            <a:avLst/>
+          </a:prstGeom>
+          <a:noFill/>
+        </p:spPr>
+        <p:txBody>
+          <a:bodyPr wrap="none" rtlCol="0">
+            <a:spAutoFit/>
+          </a:bodyPr>
+          <a:lstStyle/>
+          <a:p>
+            <a:r>
+              <a:rPr lang="en-IE" dirty="0"/>
+              <a:t>13</a:t>
+            </a:r>
+          </a:p>
+        </p:txBody>
+      </p:sp>
+      <p:sp>
+        <p:nvSpPr>
+          <p:cNvPr id="29" name="TextBox 28">
+            <a:extLst>
+              <a:ext uri="{FF2B5EF4-FFF2-40B4-BE49-F238E27FC236}">
+                <a16:creationId xmlns:a16="http://schemas.microsoft.com/office/drawing/2014/main" id="{5A6A018A-699B-45A8-B76E-8692E84753FE}"/>
+              </a:ext>
+            </a:extLst>
+          </p:cNvPr>
+          <p:cNvSpPr txBox="1"/>
+          <p:nvPr/>
+        </p:nvSpPr>
+        <p:spPr>
+          <a:xfrm>
+            <a:off x="5966860" y="1174351"/>
+            <a:ext cx="418704" cy="369332"/>
+          </a:xfrm>
+          <a:prstGeom prst="rect">
+            <a:avLst/>
+          </a:prstGeom>
+          <a:noFill/>
+        </p:spPr>
+        <p:txBody>
+          <a:bodyPr wrap="square" rtlCol="0">
+            <a:spAutoFit/>
+          </a:bodyPr>
+          <a:lstStyle/>
+          <a:p>
+            <a:r>
+              <a:rPr lang="en-IE" dirty="0"/>
+              <a:t>14</a:t>
+            </a:r>
+          </a:p>
+        </p:txBody>
+      </p:sp>
+      <p:sp>
+        <p:nvSpPr>
+          <p:cNvPr id="30" name="TextBox 29">
+            <a:extLst>
+              <a:ext uri="{FF2B5EF4-FFF2-40B4-BE49-F238E27FC236}">
+                <a16:creationId xmlns:a16="http://schemas.microsoft.com/office/drawing/2014/main" id="{5F7E8C4B-5151-464C-A271-F29BF3922358}"/>
+              </a:ext>
+            </a:extLst>
+          </p:cNvPr>
+          <p:cNvSpPr txBox="1"/>
+          <p:nvPr/>
+        </p:nvSpPr>
+        <p:spPr>
+          <a:xfrm>
+            <a:off x="8976919" y="1838480"/>
+            <a:ext cx="418704" cy="369332"/>
+          </a:xfrm>
+          <a:prstGeom prst="rect">
+            <a:avLst/>
+          </a:prstGeom>
+          <a:noFill/>
+        </p:spPr>
+        <p:txBody>
+          <a:bodyPr wrap="none" rtlCol="0">
+            <a:spAutoFit/>
+          </a:bodyPr>
+          <a:lstStyle/>
+          <a:p>
+            <a:r>
+              <a:rPr lang="en-IE" dirty="0"/>
+              <a:t>15</a:t>
+            </a:r>
+          </a:p>
+        </p:txBody>
+      </p:sp>
+      <p:sp>
+        <p:nvSpPr>
+          <p:cNvPr id="31" name="TextBox 30">
+            <a:extLst>
+              <a:ext uri="{FF2B5EF4-FFF2-40B4-BE49-F238E27FC236}">
+                <a16:creationId xmlns:a16="http://schemas.microsoft.com/office/drawing/2014/main" id="{0BFB105B-34CE-4F05-B899-942EA5ED25B5}"/>
+              </a:ext>
+            </a:extLst>
+          </p:cNvPr>
+          <p:cNvSpPr txBox="1"/>
+          <p:nvPr/>
+        </p:nvSpPr>
+        <p:spPr>
+          <a:xfrm>
+            <a:off x="5945157" y="1779757"/>
+            <a:ext cx="418704" cy="369332"/>
+          </a:xfrm>
+          <a:prstGeom prst="rect">
+            <a:avLst/>
+          </a:prstGeom>
+          <a:noFill/>
+        </p:spPr>
+        <p:txBody>
+          <a:bodyPr wrap="none" rtlCol="0">
+            <a:spAutoFit/>
+          </a:bodyPr>
+          <a:lstStyle/>
+          <a:p>
+            <a:r>
+              <a:rPr lang="en-IE" dirty="0"/>
+              <a:t>16</a:t>
+            </a:r>
+          </a:p>
+        </p:txBody>
+      </p:sp>
+      <p:sp>
+        <p:nvSpPr>
+          <p:cNvPr id="32" name="TextBox 31">
+            <a:extLst>
+              <a:ext uri="{FF2B5EF4-FFF2-40B4-BE49-F238E27FC236}">
+                <a16:creationId xmlns:a16="http://schemas.microsoft.com/office/drawing/2014/main" id="{443B2001-E72E-443E-90D4-0D376F2495A2}"/>
+              </a:ext>
+            </a:extLst>
+          </p:cNvPr>
+          <p:cNvSpPr txBox="1"/>
+          <p:nvPr/>
+        </p:nvSpPr>
+        <p:spPr>
+          <a:xfrm>
+            <a:off x="7167598" y="1873326"/>
+            <a:ext cx="418704" cy="369332"/>
+          </a:xfrm>
+          <a:prstGeom prst="rect">
+            <a:avLst/>
+          </a:prstGeom>
+          <a:noFill/>
+        </p:spPr>
+        <p:txBody>
+          <a:bodyPr wrap="none" rtlCol="0">
+            <a:spAutoFit/>
+          </a:bodyPr>
+          <a:lstStyle/>
+          <a:p>
+            <a:r>
+              <a:rPr lang="en-IE" dirty="0"/>
+              <a:t>17</a:t>
+            </a:r>
+          </a:p>
+        </p:txBody>
+      </p:sp>
+      <p:sp>
+        <p:nvSpPr>
+          <p:cNvPr id="33" name="TextBox 32">
+            <a:extLst>
+              <a:ext uri="{FF2B5EF4-FFF2-40B4-BE49-F238E27FC236}">
+                <a16:creationId xmlns:a16="http://schemas.microsoft.com/office/drawing/2014/main" id="{AC6210B3-2533-46AE-B41D-23F349B425B7}"/>
+              </a:ext>
+            </a:extLst>
+          </p:cNvPr>
+          <p:cNvSpPr txBox="1"/>
+          <p:nvPr/>
+        </p:nvSpPr>
+        <p:spPr>
+          <a:xfrm>
+            <a:off x="7720653" y="1838480"/>
+            <a:ext cx="418704" cy="369332"/>
+          </a:xfrm>
+          <a:prstGeom prst="rect">
+            <a:avLst/>
+          </a:prstGeom>
+          <a:noFill/>
+        </p:spPr>
+        <p:txBody>
+          <a:bodyPr wrap="none" rtlCol="0">
+            <a:spAutoFit/>
+          </a:bodyPr>
+          <a:lstStyle/>
+          <a:p>
+            <a:r>
+              <a:rPr lang="en-IE" dirty="0"/>
+              <a:t>18</a:t>
+            </a:r>
+          </a:p>
+        </p:txBody>
+      </p:sp>
+      <p:sp>
+        <p:nvSpPr>
+          <p:cNvPr id="34" name="TextBox 33">
+            <a:extLst>
+              <a:ext uri="{FF2B5EF4-FFF2-40B4-BE49-F238E27FC236}">
+                <a16:creationId xmlns:a16="http://schemas.microsoft.com/office/drawing/2014/main" id="{D528187F-6DAE-4052-A7A9-6FD786F44099}"/>
+              </a:ext>
+            </a:extLst>
+          </p:cNvPr>
+          <p:cNvSpPr txBox="1"/>
+          <p:nvPr/>
+        </p:nvSpPr>
+        <p:spPr>
+          <a:xfrm>
+            <a:off x="7720653" y="4883683"/>
+            <a:ext cx="418704" cy="369332"/>
+          </a:xfrm>
+          <a:prstGeom prst="rect">
+            <a:avLst/>
+          </a:prstGeom>
+          <a:noFill/>
+        </p:spPr>
+        <p:txBody>
+          <a:bodyPr wrap="none" rtlCol="0">
+            <a:spAutoFit/>
+          </a:bodyPr>
+          <a:lstStyle/>
+          <a:p>
+            <a:r>
+              <a:rPr lang="en-IE" dirty="0"/>
+              <a:t>19</a:t>
+            </a:r>
+          </a:p>
+        </p:txBody>
+      </p:sp>
+      <p:sp>
+        <p:nvSpPr>
+          <p:cNvPr id="35" name="TextBox 34">
+            <a:extLst>
+              <a:ext uri="{FF2B5EF4-FFF2-40B4-BE49-F238E27FC236}">
+                <a16:creationId xmlns:a16="http://schemas.microsoft.com/office/drawing/2014/main" id="{E9B0B5BA-AE4A-4BC6-8C60-82C097925858}"/>
+              </a:ext>
+            </a:extLst>
+          </p:cNvPr>
+          <p:cNvSpPr txBox="1"/>
+          <p:nvPr/>
+        </p:nvSpPr>
+        <p:spPr>
+          <a:xfrm>
+            <a:off x="7167598" y="4883683"/>
+            <a:ext cx="418704" cy="369332"/>
+          </a:xfrm>
+          <a:prstGeom prst="rect">
+            <a:avLst/>
+          </a:prstGeom>
+          <a:noFill/>
+        </p:spPr>
+        <p:txBody>
+          <a:bodyPr wrap="none" rtlCol="0">
+            <a:spAutoFit/>
+          </a:bodyPr>
+          <a:lstStyle/>
+          <a:p>
+            <a:r>
+              <a:rPr lang="en-IE" dirty="0"/>
+              <a:t>20</a:t>
+            </a:r>
+          </a:p>
+        </p:txBody>
+      </p:sp>
+      <p:sp>
+        <p:nvSpPr>
+          <p:cNvPr id="37" name="TextBox 36">
+            <a:extLst>
+              <a:ext uri="{FF2B5EF4-FFF2-40B4-BE49-F238E27FC236}">
+                <a16:creationId xmlns:a16="http://schemas.microsoft.com/office/drawing/2014/main" id="{265BC053-40FE-468E-9463-AEA542568C3F}"/>
+              </a:ext>
+            </a:extLst>
+          </p:cNvPr>
+          <p:cNvSpPr txBox="1"/>
+          <p:nvPr/>
+        </p:nvSpPr>
+        <p:spPr>
+          <a:xfrm>
+            <a:off x="7777118" y="5581477"/>
+            <a:ext cx="418704" cy="369332"/>
+          </a:xfrm>
+          <a:prstGeom prst="rect">
+            <a:avLst/>
+          </a:prstGeom>
+          <a:noFill/>
+        </p:spPr>
+        <p:txBody>
+          <a:bodyPr wrap="none" rtlCol="0">
+            <a:spAutoFit/>
+          </a:bodyPr>
+          <a:lstStyle/>
+          <a:p>
+            <a:r>
+              <a:rPr lang="en-IE" dirty="0"/>
+              <a:t>21</a:t>
+            </a:r>
+          </a:p>
+        </p:txBody>
+      </p:sp>
+      <p:sp>
+        <p:nvSpPr>
+          <p:cNvPr id="38" name="TextBox 37">
+            <a:extLst>
+              <a:ext uri="{FF2B5EF4-FFF2-40B4-BE49-F238E27FC236}">
+                <a16:creationId xmlns:a16="http://schemas.microsoft.com/office/drawing/2014/main" id="{4B3BFC04-8FD8-4D6E-9001-974187AD5B6C}"/>
+              </a:ext>
+            </a:extLst>
+          </p:cNvPr>
+          <p:cNvSpPr txBox="1"/>
+          <p:nvPr/>
+        </p:nvSpPr>
+        <p:spPr>
+          <a:xfrm>
+            <a:off x="9492254" y="4883683"/>
+            <a:ext cx="418704" cy="369332"/>
+          </a:xfrm>
+          <a:prstGeom prst="rect">
+            <a:avLst/>
+          </a:prstGeom>
+          <a:noFill/>
+        </p:spPr>
+        <p:txBody>
+          <a:bodyPr wrap="none" rtlCol="0">
+            <a:spAutoFit/>
+          </a:bodyPr>
+          <a:lstStyle/>
+          <a:p>
+            <a:r>
+              <a:rPr lang="en-IE" dirty="0"/>
+              <a:t>22</a:t>
+            </a:r>
+          </a:p>
+        </p:txBody>
+      </p:sp>
+      <p:sp>
+        <p:nvSpPr>
+          <p:cNvPr id="39" name="TextBox 38">
+            <a:extLst>
+              <a:ext uri="{FF2B5EF4-FFF2-40B4-BE49-F238E27FC236}">
+                <a16:creationId xmlns:a16="http://schemas.microsoft.com/office/drawing/2014/main" id="{7EF853C2-93C0-4894-B515-F51E7C2F81FA}"/>
+              </a:ext>
+            </a:extLst>
+          </p:cNvPr>
+          <p:cNvSpPr txBox="1"/>
+          <p:nvPr/>
+        </p:nvSpPr>
+        <p:spPr>
+          <a:xfrm>
+            <a:off x="9503360" y="5581477"/>
+            <a:ext cx="418704" cy="369332"/>
+          </a:xfrm>
+          <a:prstGeom prst="rect">
+            <a:avLst/>
+          </a:prstGeom>
+          <a:noFill/>
+        </p:spPr>
+        <p:txBody>
+          <a:bodyPr wrap="none" rtlCol="0">
+            <a:spAutoFit/>
+          </a:bodyPr>
+          <a:lstStyle/>
+          <a:p>
+            <a:r>
+              <a:rPr lang="en-IE" dirty="0"/>
+              <a:t>23</a:t>
+            </a:r>
+          </a:p>
+        </p:txBody>
+      </p:sp>
+      <p:sp>
+        <p:nvSpPr>
+          <p:cNvPr id="40" name="TextBox 39">
+            <a:extLst>
+              <a:ext uri="{FF2B5EF4-FFF2-40B4-BE49-F238E27FC236}">
+                <a16:creationId xmlns:a16="http://schemas.microsoft.com/office/drawing/2014/main" id="{58C3AEE0-28C8-423B-90AA-3B6F2847D601}"/>
+              </a:ext>
+            </a:extLst>
+          </p:cNvPr>
+          <p:cNvSpPr txBox="1"/>
+          <p:nvPr/>
+        </p:nvSpPr>
+        <p:spPr>
+          <a:xfrm>
+            <a:off x="5241259" y="2460663"/>
+            <a:ext cx="418704" cy="369332"/>
+          </a:xfrm>
+          <a:prstGeom prst="rect">
+            <a:avLst/>
+          </a:prstGeom>
+          <a:noFill/>
+        </p:spPr>
+        <p:txBody>
+          <a:bodyPr wrap="none" rtlCol="0">
+            <a:spAutoFit/>
+          </a:bodyPr>
+          <a:lstStyle/>
+          <a:p>
+            <a:r>
+              <a:rPr lang="en-IE" dirty="0"/>
+              <a:t>24</a:t>
+            </a:r>
+          </a:p>
+        </p:txBody>
+      </p:sp>
+      <p:sp>
+        <p:nvSpPr>
+          <p:cNvPr id="41" name="TextBox 40">
+            <a:extLst>
+              <a:ext uri="{FF2B5EF4-FFF2-40B4-BE49-F238E27FC236}">
+                <a16:creationId xmlns:a16="http://schemas.microsoft.com/office/drawing/2014/main" id="{3767DAA3-B208-4DBC-81CC-217FE1BA81F3}"/>
+              </a:ext>
+            </a:extLst>
+          </p:cNvPr>
+          <p:cNvSpPr txBox="1"/>
+          <p:nvPr/>
+        </p:nvSpPr>
+        <p:spPr>
+          <a:xfrm>
+            <a:off x="4652299" y="2460663"/>
+            <a:ext cx="418704" cy="369332"/>
+          </a:xfrm>
+          <a:prstGeom prst="rect">
+            <a:avLst/>
+          </a:prstGeom>
+          <a:noFill/>
+        </p:spPr>
+        <p:txBody>
+          <a:bodyPr wrap="none" rtlCol="0">
+            <a:spAutoFit/>
+          </a:bodyPr>
+          <a:lstStyle/>
+          <a:p>
+            <a:r>
+              <a:rPr lang="en-IE" dirty="0"/>
+              <a:t>25</a:t>
+            </a:r>
+          </a:p>
+        </p:txBody>
+      </p:sp>
+      <p:sp>
+        <p:nvSpPr>
+          <p:cNvPr id="42" name="TextBox 41">
+            <a:extLst>
+              <a:ext uri="{FF2B5EF4-FFF2-40B4-BE49-F238E27FC236}">
+                <a16:creationId xmlns:a16="http://schemas.microsoft.com/office/drawing/2014/main" id="{D1A4D56D-901B-497A-AF79-5E475E6B3E05}"/>
+              </a:ext>
+            </a:extLst>
+          </p:cNvPr>
+          <p:cNvSpPr txBox="1"/>
+          <p:nvPr/>
+        </p:nvSpPr>
+        <p:spPr>
+          <a:xfrm>
+            <a:off x="4709620" y="4883683"/>
+            <a:ext cx="418704" cy="369332"/>
+          </a:xfrm>
+          <a:prstGeom prst="rect">
+            <a:avLst/>
+          </a:prstGeom>
+          <a:noFill/>
+        </p:spPr>
+        <p:txBody>
+          <a:bodyPr wrap="none" rtlCol="0">
+            <a:spAutoFit/>
+          </a:bodyPr>
+          <a:lstStyle/>
+          <a:p>
+            <a:r>
+              <a:rPr lang="en-IE" dirty="0"/>
+              <a:t>26</a:t>
+            </a:r>
+          </a:p>
+        </p:txBody>
+      </p:sp>
+      <p:sp>
+        <p:nvSpPr>
+          <p:cNvPr id="43" name="TextBox 42">
+            <a:extLst>
+              <a:ext uri="{FF2B5EF4-FFF2-40B4-BE49-F238E27FC236}">
+                <a16:creationId xmlns:a16="http://schemas.microsoft.com/office/drawing/2014/main" id="{F6A9831A-0DC0-4511-B825-B6D0334FA033}"/>
+              </a:ext>
+            </a:extLst>
+          </p:cNvPr>
+          <p:cNvSpPr txBox="1"/>
+          <p:nvPr/>
+        </p:nvSpPr>
+        <p:spPr>
+          <a:xfrm>
+            <a:off x="4700153" y="5648882"/>
+            <a:ext cx="418704" cy="369332"/>
+          </a:xfrm>
+          <a:prstGeom prst="rect">
+            <a:avLst/>
+          </a:prstGeom>
+          <a:noFill/>
+        </p:spPr>
+        <p:txBody>
+          <a:bodyPr wrap="none" rtlCol="0">
+            <a:spAutoFit/>
+          </a:bodyPr>
+          <a:lstStyle/>
+          <a:p>
+            <a:r>
+              <a:rPr lang="en-IE" dirty="0"/>
+              <a:t>27</a:t>
+            </a:r>
+          </a:p>
+        </p:txBody>
+      </p:sp>
+      <p:sp>
+        <p:nvSpPr>
+          <p:cNvPr id="44" name="TextBox 43">
+            <a:extLst>
+              <a:ext uri="{FF2B5EF4-FFF2-40B4-BE49-F238E27FC236}">
+                <a16:creationId xmlns:a16="http://schemas.microsoft.com/office/drawing/2014/main" id="{247930F2-2DCF-4CF2-BEEB-14F8CDA8F4B8}"/>
+              </a:ext>
+            </a:extLst>
+          </p:cNvPr>
+          <p:cNvSpPr txBox="1"/>
+          <p:nvPr/>
+        </p:nvSpPr>
+        <p:spPr>
+          <a:xfrm>
+            <a:off x="4061382" y="6176986"/>
+            <a:ext cx="418704" cy="369332"/>
+          </a:xfrm>
+          <a:prstGeom prst="rect">
+            <a:avLst/>
+          </a:prstGeom>
+          <a:noFill/>
+        </p:spPr>
+        <p:txBody>
+          <a:bodyPr wrap="none" rtlCol="0">
+            <a:spAutoFit/>
+          </a:bodyPr>
+          <a:lstStyle/>
+          <a:p>
+            <a:r>
+              <a:rPr lang="en-IE" dirty="0"/>
+              <a:t>28</a:t>
+            </a:r>
+          </a:p>
+        </p:txBody>
+      </p:sp>
+      <p:sp>
+        <p:nvSpPr>
+          <p:cNvPr id="45" name="TextBox 44">
+            <a:extLst>
+              <a:ext uri="{FF2B5EF4-FFF2-40B4-BE49-F238E27FC236}">
+                <a16:creationId xmlns:a16="http://schemas.microsoft.com/office/drawing/2014/main" id="{61F568B0-5CCC-4416-87F6-E256B7670284}"/>
+              </a:ext>
+            </a:extLst>
+          </p:cNvPr>
+          <p:cNvSpPr txBox="1"/>
+          <p:nvPr/>
+        </p:nvSpPr>
+        <p:spPr>
+          <a:xfrm>
+            <a:off x="3415232" y="6242701"/>
+            <a:ext cx="418704" cy="369332"/>
+          </a:xfrm>
+          <a:prstGeom prst="rect">
+            <a:avLst/>
+          </a:prstGeom>
+          <a:noFill/>
+        </p:spPr>
+        <p:txBody>
+          <a:bodyPr wrap="none" rtlCol="0">
+            <a:spAutoFit/>
+          </a:bodyPr>
+          <a:lstStyle/>
+          <a:p>
+            <a:r>
+              <a:rPr lang="en-IE" dirty="0"/>
+              <a:t>29</a:t>
+            </a:r>
+          </a:p>
+        </p:txBody>
+      </p:sp>
+      <p:sp>
+        <p:nvSpPr>
+          <p:cNvPr id="46" name="TextBox 45">
+            <a:extLst>
+              <a:ext uri="{FF2B5EF4-FFF2-40B4-BE49-F238E27FC236}">
+                <a16:creationId xmlns:a16="http://schemas.microsoft.com/office/drawing/2014/main" id="{C1A906DF-63F4-44AA-A166-0408E7940633}"/>
+              </a:ext>
+            </a:extLst>
+          </p:cNvPr>
+          <p:cNvSpPr txBox="1"/>
+          <p:nvPr/>
+        </p:nvSpPr>
+        <p:spPr>
+          <a:xfrm>
+            <a:off x="1661118" y="6176986"/>
+            <a:ext cx="418704" cy="369332"/>
+          </a:xfrm>
+          <a:prstGeom prst="rect">
+            <a:avLst/>
+          </a:prstGeom>
+          <a:noFill/>
+        </p:spPr>
+        <p:txBody>
+          <a:bodyPr wrap="none" rtlCol="0">
+            <a:spAutoFit/>
+          </a:bodyPr>
+          <a:lstStyle/>
+          <a:p>
+            <a:r>
+              <a:rPr lang="en-IE" dirty="0"/>
+              <a:t>30</a:t>
+            </a:r>
+          </a:p>
+        </p:txBody>
+      </p:sp>
+      <p:sp>
+        <p:nvSpPr>
+          <p:cNvPr id="47" name="TextBox 46">
+            <a:extLst>
+              <a:ext uri="{FF2B5EF4-FFF2-40B4-BE49-F238E27FC236}">
+                <a16:creationId xmlns:a16="http://schemas.microsoft.com/office/drawing/2014/main" id="{144E04C8-1454-478B-AB19-01E4CE4F7DF5}"/>
+              </a:ext>
+            </a:extLst>
+          </p:cNvPr>
+          <p:cNvSpPr txBox="1"/>
+          <p:nvPr/>
+        </p:nvSpPr>
+        <p:spPr>
+          <a:xfrm>
+            <a:off x="1030653" y="5581477"/>
+            <a:ext cx="418704" cy="369332"/>
+          </a:xfrm>
+          <a:prstGeom prst="rect">
+            <a:avLst/>
+          </a:prstGeom>
+          <a:noFill/>
+        </p:spPr>
+        <p:txBody>
+          <a:bodyPr wrap="none" rtlCol="0">
+            <a:spAutoFit/>
+          </a:bodyPr>
+          <a:lstStyle/>
+          <a:p>
+            <a:r>
+              <a:rPr lang="en-IE" dirty="0"/>
+              <a:t>31</a:t>
+            </a:r>
+          </a:p>
+        </p:txBody>
+      </p:sp>
+      <p:sp>
+        <p:nvSpPr>
+          <p:cNvPr id="48" name="TextBox 47">
+            <a:extLst>
+              <a:ext uri="{FF2B5EF4-FFF2-40B4-BE49-F238E27FC236}">
+                <a16:creationId xmlns:a16="http://schemas.microsoft.com/office/drawing/2014/main" id="{CE125C6F-DA4D-497C-8048-21D9968B050E}"/>
+              </a:ext>
+            </a:extLst>
+          </p:cNvPr>
+          <p:cNvSpPr txBox="1"/>
+          <p:nvPr/>
+        </p:nvSpPr>
+        <p:spPr>
+          <a:xfrm>
+            <a:off x="1015763" y="4883683"/>
+            <a:ext cx="418704" cy="369332"/>
+          </a:xfrm>
+          <a:prstGeom prst="rect">
+            <a:avLst/>
+          </a:prstGeom>
+          <a:noFill/>
+        </p:spPr>
+        <p:txBody>
+          <a:bodyPr wrap="none" rtlCol="0">
+            <a:spAutoFit/>
+          </a:bodyPr>
+          <a:lstStyle/>
+          <a:p>
+            <a:r>
+              <a:rPr lang="en-IE" dirty="0"/>
+              <a:t>32</a:t>
+            </a:r>
+          </a:p>
+        </p:txBody>
+      </p:sp>
+      <p:sp>
+        <p:nvSpPr>
+          <p:cNvPr id="49" name="TextBox 48">
+            <a:extLst>
+              <a:ext uri="{FF2B5EF4-FFF2-40B4-BE49-F238E27FC236}">
+                <a16:creationId xmlns:a16="http://schemas.microsoft.com/office/drawing/2014/main" id="{BBA2FDEF-0092-41B9-85A4-5B2A6BD1F729}"/>
+              </a:ext>
+            </a:extLst>
+          </p:cNvPr>
+          <p:cNvSpPr txBox="1"/>
+          <p:nvPr/>
+        </p:nvSpPr>
+        <p:spPr>
+          <a:xfrm>
+            <a:off x="1648105" y="4317774"/>
+            <a:ext cx="418704" cy="369332"/>
+          </a:xfrm>
+          <a:prstGeom prst="rect">
+            <a:avLst/>
+          </a:prstGeom>
+          <a:noFill/>
+        </p:spPr>
+        <p:txBody>
+          <a:bodyPr wrap="none" rtlCol="0">
+            <a:spAutoFit/>
+          </a:bodyPr>
+          <a:lstStyle/>
+          <a:p>
+            <a:r>
+              <a:rPr lang="en-IE" dirty="0"/>
+              <a:t>33</a:t>
+            </a:r>
+          </a:p>
+        </p:txBody>
+      </p:sp>
+      <p:sp>
+        <p:nvSpPr>
+          <p:cNvPr id="50" name="TextBox 49">
+            <a:extLst>
+              <a:ext uri="{FF2B5EF4-FFF2-40B4-BE49-F238E27FC236}">
+                <a16:creationId xmlns:a16="http://schemas.microsoft.com/office/drawing/2014/main" id="{BFD3F739-CFA9-4F4D-A80B-75EC01D413D0}"/>
+              </a:ext>
+            </a:extLst>
+          </p:cNvPr>
+          <p:cNvSpPr txBox="1"/>
+          <p:nvPr/>
+        </p:nvSpPr>
+        <p:spPr>
+          <a:xfrm>
+            <a:off x="2836975" y="4296802"/>
+            <a:ext cx="418704" cy="369332"/>
+          </a:xfrm>
+          <a:prstGeom prst="rect">
+            <a:avLst/>
+          </a:prstGeom>
+          <a:noFill/>
+        </p:spPr>
+        <p:txBody>
+          <a:bodyPr wrap="none" rtlCol="0">
+            <a:spAutoFit/>
+          </a:bodyPr>
+          <a:lstStyle/>
+          <a:p>
+            <a:r>
+              <a:rPr lang="en-IE" dirty="0"/>
+              <a:t>34</a:t>
+            </a:r>
+          </a:p>
+        </p:txBody>
+      </p:sp>
+      <p:sp>
+        <p:nvSpPr>
+          <p:cNvPr id="51" name="TextBox 50">
+            <a:extLst>
+              <a:ext uri="{FF2B5EF4-FFF2-40B4-BE49-F238E27FC236}">
+                <a16:creationId xmlns:a16="http://schemas.microsoft.com/office/drawing/2014/main" id="{69798D24-B9D9-4B7C-A10B-D909D2976D47}"/>
+              </a:ext>
+            </a:extLst>
+          </p:cNvPr>
+          <p:cNvSpPr txBox="1"/>
+          <p:nvPr/>
+        </p:nvSpPr>
+        <p:spPr>
+          <a:xfrm>
+            <a:off x="2836975" y="2460663"/>
+            <a:ext cx="418704" cy="369332"/>
+          </a:xfrm>
+          <a:prstGeom prst="rect">
+            <a:avLst/>
+          </a:prstGeom>
+          <a:noFill/>
+        </p:spPr>
+        <p:txBody>
+          <a:bodyPr wrap="none" rtlCol="0">
+            <a:spAutoFit/>
+          </a:bodyPr>
+          <a:lstStyle/>
+          <a:p>
+            <a:r>
+              <a:rPr lang="en-IE" dirty="0"/>
+              <a:t>35</a:t>
+            </a:r>
+          </a:p>
+        </p:txBody>
+      </p:sp>
+      <p:sp>
+        <p:nvSpPr>
+          <p:cNvPr id="52" name="TextBox 51">
+            <a:extLst>
+              <a:ext uri="{FF2B5EF4-FFF2-40B4-BE49-F238E27FC236}">
+                <a16:creationId xmlns:a16="http://schemas.microsoft.com/office/drawing/2014/main" id="{9B2EED6E-6CFA-4BF3-B842-1B7989A857B0}"/>
+              </a:ext>
+            </a:extLst>
+          </p:cNvPr>
+          <p:cNvSpPr txBox="1"/>
+          <p:nvPr/>
+        </p:nvSpPr>
+        <p:spPr>
+          <a:xfrm>
+            <a:off x="2289709" y="2460663"/>
+            <a:ext cx="418704" cy="369332"/>
+          </a:xfrm>
+          <a:prstGeom prst="rect">
+            <a:avLst/>
+          </a:prstGeom>
+          <a:noFill/>
+        </p:spPr>
+        <p:txBody>
+          <a:bodyPr wrap="none" rtlCol="0">
+            <a:spAutoFit/>
+          </a:bodyPr>
+          <a:lstStyle/>
+          <a:p>
+            <a:r>
+              <a:rPr lang="en-IE" dirty="0"/>
+              <a:t>36</a:t>
+            </a:r>
+          </a:p>
+        </p:txBody>
+      </p:sp>
+      <p:sp>
+        <p:nvSpPr>
+          <p:cNvPr id="53" name="TextBox 52">
+            <a:extLst>
+              <a:ext uri="{FF2B5EF4-FFF2-40B4-BE49-F238E27FC236}">
+                <a16:creationId xmlns:a16="http://schemas.microsoft.com/office/drawing/2014/main" id="{3074C8F7-02C2-477E-AEA7-3D37A68297B7}"/>
+              </a:ext>
+            </a:extLst>
+          </p:cNvPr>
+          <p:cNvSpPr txBox="1"/>
+          <p:nvPr/>
+        </p:nvSpPr>
+        <p:spPr>
+          <a:xfrm>
+            <a:off x="1644579" y="1838480"/>
+            <a:ext cx="418704" cy="369332"/>
+          </a:xfrm>
+          <a:prstGeom prst="rect">
+            <a:avLst/>
+          </a:prstGeom>
+          <a:noFill/>
+        </p:spPr>
+        <p:txBody>
+          <a:bodyPr wrap="none" rtlCol="0">
+            <a:spAutoFit/>
+          </a:bodyPr>
+          <a:lstStyle/>
+          <a:p>
+            <a:r>
+              <a:rPr lang="en-IE" dirty="0"/>
+              <a:t>37</a:t>
+            </a:r>
+          </a:p>
+        </p:txBody>
+      </p:sp>
+      <p:sp>
+        <p:nvSpPr>
+          <p:cNvPr id="54" name="TextBox 53">
+            <a:extLst>
+              <a:ext uri="{FF2B5EF4-FFF2-40B4-BE49-F238E27FC236}">
+                <a16:creationId xmlns:a16="http://schemas.microsoft.com/office/drawing/2014/main" id="{6415A19F-28EF-4F22-A249-9ED97EFEF4F3}"/>
+              </a:ext>
+            </a:extLst>
+          </p:cNvPr>
+          <p:cNvSpPr txBox="1"/>
+          <p:nvPr/>
+        </p:nvSpPr>
+        <p:spPr>
+          <a:xfrm>
+            <a:off x="1622617" y="1190389"/>
+            <a:ext cx="418704" cy="369332"/>
+          </a:xfrm>
+          <a:prstGeom prst="rect">
+            <a:avLst/>
+          </a:prstGeom>
+          <a:noFill/>
+        </p:spPr>
+        <p:txBody>
+          <a:bodyPr wrap="none" rtlCol="0">
+            <a:spAutoFit/>
+          </a:bodyPr>
+          <a:lstStyle/>
+          <a:p>
+            <a:r>
+              <a:rPr lang="en-IE" dirty="0"/>
+              <a:t>38</a:t>
+            </a:r>
+          </a:p>
+        </p:txBody>
+      </p:sp>
+      <p:sp>
+        <p:nvSpPr>
+          <p:cNvPr id="55" name="TextBox 54">
+            <a:extLst>
+              <a:ext uri="{FF2B5EF4-FFF2-40B4-BE49-F238E27FC236}">
+                <a16:creationId xmlns:a16="http://schemas.microsoft.com/office/drawing/2014/main" id="{2BC340BB-2B52-4143-B797-F3B2BEC613D2}"/>
+              </a:ext>
+            </a:extLst>
+          </p:cNvPr>
+          <p:cNvSpPr txBox="1"/>
+          <p:nvPr/>
+        </p:nvSpPr>
+        <p:spPr>
+          <a:xfrm>
+            <a:off x="2339181" y="568945"/>
+            <a:ext cx="418704" cy="369332"/>
+          </a:xfrm>
+          <a:prstGeom prst="rect">
+            <a:avLst/>
+          </a:prstGeom>
+          <a:noFill/>
+        </p:spPr>
+        <p:txBody>
+          <a:bodyPr wrap="none" rtlCol="0">
+            <a:spAutoFit/>
+          </a:bodyPr>
+          <a:lstStyle/>
+          <a:p>
+            <a:r>
+              <a:rPr lang="en-IE" dirty="0"/>
+              <a:t>39</a:t>
+            </a:r>
+          </a:p>
+        </p:txBody>
+      </p:sp>
+      <p:sp>
+        <p:nvSpPr>
+          <p:cNvPr id="56" name="TextBox 55">
+            <a:extLst>
+              <a:ext uri="{FF2B5EF4-FFF2-40B4-BE49-F238E27FC236}">
+                <a16:creationId xmlns:a16="http://schemas.microsoft.com/office/drawing/2014/main" id="{C652B3B1-4D21-42F6-A3A6-C134381A4CF4}"/>
+              </a:ext>
+            </a:extLst>
+          </p:cNvPr>
+          <p:cNvSpPr txBox="1"/>
+          <p:nvPr/>
+        </p:nvSpPr>
+        <p:spPr>
+          <a:xfrm>
+            <a:off x="5241259" y="678111"/>
+            <a:ext cx="418704" cy="369332"/>
+          </a:xfrm>
+          <a:prstGeom prst="rect">
+            <a:avLst/>
+          </a:prstGeom>
+          <a:noFill/>
+        </p:spPr>
+        <p:txBody>
+          <a:bodyPr wrap="none" rtlCol="0">
+            <a:spAutoFit/>
+          </a:bodyPr>
+          <a:lstStyle/>
+          <a:p>
+            <a:r>
+              <a:rPr lang="en-IE" dirty="0"/>
+              <a:t>40</a:t>
+            </a:r>
+          </a:p>
+        </p:txBody>
+      </p:sp>
+      <p:cxnSp>
+        <p:nvCxnSpPr>
+          <p:cNvPr id="57" name="Straight Connector 56">
+            <a:extLst>
+              <a:ext uri="{FF2B5EF4-FFF2-40B4-BE49-F238E27FC236}">
+                <a16:creationId xmlns:a16="http://schemas.microsoft.com/office/drawing/2014/main" id="{0E9FE365-B3B3-4BA4-B8AE-C9FFD06DBA47}"/>
+              </a:ext>
+            </a:extLst>
+          </p:cNvPr>
+          <p:cNvCxnSpPr>
+            <a:cxnSpLocks/>
+          </p:cNvCxnSpPr>
+          <p:nvPr/>
+        </p:nvCxnSpPr>
+        <p:spPr>
+          <a:xfrm flipH="1" flipV="1">
+            <a:off x="2393199" y="1364049"/>
+            <a:ext cx="3148921" cy="716126"/>
+          </a:xfrm>
+          <a:prstGeom prst="line">
+            <a:avLst/>
+          </a:prstGeom>
+          <a:ln w="76200">
+            <a:solidFill>
+              <a:schemeClr val="tx2"/>
+            </a:solidFill>
+          </a:ln>
+        </p:spPr>
+        <p:style>
+          <a:lnRef idx="1">
+            <a:schemeClr val="accent1"/>
+          </a:lnRef>
+          <a:fillRef idx="0">
+            <a:schemeClr val="accent1"/>
+          </a:fillRef>
+          <a:effectRef idx="0">
+            <a:schemeClr val="accent1"/>
+          </a:effectRef>
+          <a:fontRef idx="minor">
+            <a:schemeClr val="tx1"/>
+          </a:fontRef>
+        </p:style>
+      </p:cxnSp>
+      <p:cxnSp>
+        <p:nvCxnSpPr>
+          <p:cNvPr id="59" name="Straight Connector 58">
+            <a:extLst>
+              <a:ext uri="{FF2B5EF4-FFF2-40B4-BE49-F238E27FC236}">
+                <a16:creationId xmlns:a16="http://schemas.microsoft.com/office/drawing/2014/main" id="{CCE8AC83-344A-467A-8BC6-8B1D36C91FB2}"/>
+              </a:ext>
+            </a:extLst>
+          </p:cNvPr>
+          <p:cNvCxnSpPr>
+            <a:cxnSpLocks/>
+            <a:endCxn id="19" idx="1"/>
+          </p:cNvCxnSpPr>
+          <p:nvPr/>
+        </p:nvCxnSpPr>
+        <p:spPr>
+          <a:xfrm flipH="1" flipV="1">
+            <a:off x="3551561" y="2023146"/>
+            <a:ext cx="746314" cy="9358"/>
+          </a:xfrm>
+          <a:prstGeom prst="line">
+            <a:avLst/>
+          </a:prstGeom>
+          <a:ln w="76200">
+            <a:solidFill>
+              <a:schemeClr val="tx2"/>
+            </a:solidFill>
+          </a:ln>
+        </p:spPr>
+        <p:style>
+          <a:lnRef idx="1">
+            <a:schemeClr val="accent1"/>
+          </a:lnRef>
+          <a:fillRef idx="0">
+            <a:schemeClr val="accent1"/>
+          </a:fillRef>
+          <a:effectRef idx="0">
+            <a:schemeClr val="accent1"/>
+          </a:effectRef>
+          <a:fontRef idx="minor">
+            <a:schemeClr val="tx1"/>
+          </a:fontRef>
+        </p:style>
+      </p:cxnSp>
+      <p:cxnSp>
+        <p:nvCxnSpPr>
+          <p:cNvPr id="60" name="Straight Connector 59">
+            <a:extLst>
+              <a:ext uri="{FF2B5EF4-FFF2-40B4-BE49-F238E27FC236}">
+                <a16:creationId xmlns:a16="http://schemas.microsoft.com/office/drawing/2014/main" id="{DC789151-0A23-40DE-B6C7-5AD441A4E1CB}"/>
+              </a:ext>
+            </a:extLst>
+          </p:cNvPr>
+          <p:cNvCxnSpPr>
+            <a:cxnSpLocks/>
+          </p:cNvCxnSpPr>
+          <p:nvPr/>
+        </p:nvCxnSpPr>
+        <p:spPr>
+          <a:xfrm flipH="1">
+            <a:off x="3687677" y="2018114"/>
+            <a:ext cx="610199" cy="1897822"/>
+          </a:xfrm>
+          <a:prstGeom prst="line">
+            <a:avLst/>
+          </a:prstGeom>
+          <a:ln w="76200">
+            <a:solidFill>
+              <a:schemeClr val="tx2"/>
+            </a:solidFill>
+          </a:ln>
+        </p:spPr>
+        <p:style>
+          <a:lnRef idx="1">
+            <a:schemeClr val="accent1"/>
+          </a:lnRef>
+          <a:fillRef idx="0">
+            <a:schemeClr val="accent1"/>
+          </a:fillRef>
+          <a:effectRef idx="0">
+            <a:schemeClr val="accent1"/>
+          </a:effectRef>
+          <a:fontRef idx="minor">
+            <a:schemeClr val="tx1"/>
+          </a:fontRef>
+        </p:style>
+      </p:cxnSp>
+      <p:cxnSp>
+        <p:nvCxnSpPr>
+          <p:cNvPr id="61" name="Straight Connector 60">
+            <a:extLst>
+              <a:ext uri="{FF2B5EF4-FFF2-40B4-BE49-F238E27FC236}">
+                <a16:creationId xmlns:a16="http://schemas.microsoft.com/office/drawing/2014/main" id="{9ACD25E4-52CC-4447-996D-AA1A050322EF}"/>
+              </a:ext>
+            </a:extLst>
+          </p:cNvPr>
+          <p:cNvCxnSpPr>
+            <a:cxnSpLocks/>
+            <a:stCxn id="26" idx="1"/>
+          </p:cNvCxnSpPr>
+          <p:nvPr/>
+        </p:nvCxnSpPr>
+        <p:spPr>
+          <a:xfrm>
+            <a:off x="3610070" y="3815189"/>
+            <a:ext cx="705039" cy="1253160"/>
+          </a:xfrm>
+          <a:prstGeom prst="line">
+            <a:avLst/>
+          </a:prstGeom>
+          <a:ln w="76200">
+            <a:solidFill>
+              <a:schemeClr val="tx2"/>
+            </a:solidFill>
+          </a:ln>
+        </p:spPr>
+        <p:style>
+          <a:lnRef idx="1">
+            <a:schemeClr val="accent1"/>
+          </a:lnRef>
+          <a:fillRef idx="0">
+            <a:schemeClr val="accent1"/>
+          </a:fillRef>
+          <a:effectRef idx="0">
+            <a:schemeClr val="accent1"/>
+          </a:effectRef>
+          <a:fontRef idx="minor">
+            <a:schemeClr val="tx1"/>
+          </a:fontRef>
+        </p:style>
+      </p:cxnSp>
+      <p:cxnSp>
+        <p:nvCxnSpPr>
+          <p:cNvPr id="62" name="Straight Connector 61">
+            <a:extLst>
+              <a:ext uri="{FF2B5EF4-FFF2-40B4-BE49-F238E27FC236}">
+                <a16:creationId xmlns:a16="http://schemas.microsoft.com/office/drawing/2014/main" id="{ECB09DC6-48C7-42A2-A6D9-AD387A2D246A}"/>
+              </a:ext>
+            </a:extLst>
+          </p:cNvPr>
+          <p:cNvCxnSpPr>
+            <a:cxnSpLocks/>
+          </p:cNvCxnSpPr>
+          <p:nvPr/>
+        </p:nvCxnSpPr>
+        <p:spPr>
+          <a:xfrm flipH="1">
+            <a:off x="3618445" y="5122879"/>
+            <a:ext cx="679430" cy="0"/>
+          </a:xfrm>
+          <a:prstGeom prst="line">
+            <a:avLst/>
+          </a:prstGeom>
+          <a:ln w="76200">
+            <a:solidFill>
+              <a:schemeClr val="tx2"/>
+            </a:solidFill>
+          </a:ln>
+        </p:spPr>
+        <p:style>
+          <a:lnRef idx="1">
+            <a:schemeClr val="accent1"/>
+          </a:lnRef>
+          <a:fillRef idx="0">
+            <a:schemeClr val="accent1"/>
+          </a:fillRef>
+          <a:effectRef idx="0">
+            <a:schemeClr val="accent1"/>
+          </a:effectRef>
+          <a:fontRef idx="minor">
+            <a:schemeClr val="tx1"/>
+          </a:fontRef>
+        </p:style>
+      </p:cxnSp>
+      <p:cxnSp>
+        <p:nvCxnSpPr>
+          <p:cNvPr id="63" name="Straight Connector 62">
+            <a:extLst>
+              <a:ext uri="{FF2B5EF4-FFF2-40B4-BE49-F238E27FC236}">
+                <a16:creationId xmlns:a16="http://schemas.microsoft.com/office/drawing/2014/main" id="{937F68D5-A24B-4EC6-B7AB-E8FD88AEA163}"/>
+              </a:ext>
+            </a:extLst>
+          </p:cNvPr>
+          <p:cNvCxnSpPr>
+            <a:cxnSpLocks/>
+          </p:cNvCxnSpPr>
+          <p:nvPr/>
+        </p:nvCxnSpPr>
+        <p:spPr>
+          <a:xfrm>
+            <a:off x="3653269" y="5122879"/>
+            <a:ext cx="21971" cy="710669"/>
+          </a:xfrm>
+          <a:prstGeom prst="line">
+            <a:avLst/>
+          </a:prstGeom>
+          <a:ln w="76200">
+            <a:solidFill>
+              <a:schemeClr val="tx2"/>
+            </a:solidFill>
+          </a:ln>
+        </p:spPr>
+        <p:style>
+          <a:lnRef idx="1">
+            <a:schemeClr val="accent1"/>
+          </a:lnRef>
+          <a:fillRef idx="0">
+            <a:schemeClr val="accent1"/>
+          </a:fillRef>
+          <a:effectRef idx="0">
+            <a:schemeClr val="accent1"/>
+          </a:effectRef>
+          <a:fontRef idx="minor">
+            <a:schemeClr val="tx1"/>
+          </a:fontRef>
+        </p:style>
+      </p:cxnSp>
+      <p:cxnSp>
+        <p:nvCxnSpPr>
+          <p:cNvPr id="64" name="Straight Connector 63">
+            <a:extLst>
+              <a:ext uri="{FF2B5EF4-FFF2-40B4-BE49-F238E27FC236}">
+                <a16:creationId xmlns:a16="http://schemas.microsoft.com/office/drawing/2014/main" id="{58D13EFE-A11E-4DE3-AF53-4DE16089C9FF}"/>
+              </a:ext>
+            </a:extLst>
+          </p:cNvPr>
+          <p:cNvCxnSpPr>
+            <a:cxnSpLocks/>
+          </p:cNvCxnSpPr>
+          <p:nvPr/>
+        </p:nvCxnSpPr>
+        <p:spPr>
+          <a:xfrm flipH="1">
+            <a:off x="1870470" y="5122879"/>
+            <a:ext cx="1782799" cy="643264"/>
+          </a:xfrm>
+          <a:prstGeom prst="line">
+            <a:avLst/>
+          </a:prstGeom>
+          <a:ln w="76200">
+            <a:solidFill>
+              <a:schemeClr val="tx2"/>
+            </a:solidFill>
+          </a:ln>
+        </p:spPr>
+        <p:style>
+          <a:lnRef idx="1">
+            <a:schemeClr val="accent1"/>
+          </a:lnRef>
+          <a:fillRef idx="0">
+            <a:schemeClr val="accent1"/>
+          </a:fillRef>
+          <a:effectRef idx="0">
+            <a:schemeClr val="accent1"/>
+          </a:effectRef>
+          <a:fontRef idx="minor">
+            <a:schemeClr val="tx1"/>
+          </a:fontRef>
+        </p:style>
+      </p:cxnSp>
+      <p:cxnSp>
+        <p:nvCxnSpPr>
+          <p:cNvPr id="66" name="Straight Connector 65">
+            <a:extLst>
+              <a:ext uri="{FF2B5EF4-FFF2-40B4-BE49-F238E27FC236}">
+                <a16:creationId xmlns:a16="http://schemas.microsoft.com/office/drawing/2014/main" id="{62AA5974-BCB7-446F-BA87-57EFED722DAD}"/>
+              </a:ext>
+            </a:extLst>
+          </p:cNvPr>
+          <p:cNvCxnSpPr>
+            <a:cxnSpLocks/>
+          </p:cNvCxnSpPr>
+          <p:nvPr/>
+        </p:nvCxnSpPr>
+        <p:spPr>
+          <a:xfrm>
+            <a:off x="5506159" y="1359017"/>
+            <a:ext cx="619242" cy="668808"/>
+          </a:xfrm>
+          <a:prstGeom prst="line">
+            <a:avLst/>
+          </a:prstGeom>
+          <a:ln w="76200">
+            <a:solidFill>
+              <a:schemeClr val="tx2"/>
+            </a:solidFill>
+          </a:ln>
+        </p:spPr>
+        <p:style>
+          <a:lnRef idx="1">
+            <a:schemeClr val="accent1"/>
+          </a:lnRef>
+          <a:fillRef idx="0">
+            <a:schemeClr val="accent1"/>
+          </a:fillRef>
+          <a:effectRef idx="0">
+            <a:schemeClr val="accent1"/>
+          </a:effectRef>
+          <a:fontRef idx="minor">
+            <a:schemeClr val="tx1"/>
+          </a:fontRef>
+        </p:style>
+      </p:cxnSp>
+      <p:cxnSp>
+        <p:nvCxnSpPr>
+          <p:cNvPr id="69" name="Straight Connector 68">
+            <a:extLst>
+              <a:ext uri="{FF2B5EF4-FFF2-40B4-BE49-F238E27FC236}">
+                <a16:creationId xmlns:a16="http://schemas.microsoft.com/office/drawing/2014/main" id="{5DAFDF22-EACD-4B87-B47D-622EBEC3E395}"/>
+              </a:ext>
+            </a:extLst>
+          </p:cNvPr>
+          <p:cNvCxnSpPr>
+            <a:cxnSpLocks/>
+          </p:cNvCxnSpPr>
+          <p:nvPr/>
+        </p:nvCxnSpPr>
+        <p:spPr>
+          <a:xfrm flipH="1">
+            <a:off x="6142447" y="1375055"/>
+            <a:ext cx="2951490" cy="643059"/>
+          </a:xfrm>
+          <a:prstGeom prst="line">
+            <a:avLst/>
+          </a:prstGeom>
+          <a:ln w="76200">
+            <a:solidFill>
+              <a:schemeClr val="tx2"/>
+            </a:solidFill>
+          </a:ln>
+        </p:spPr>
+        <p:style>
+          <a:lnRef idx="1">
+            <a:schemeClr val="accent1"/>
+          </a:lnRef>
+          <a:fillRef idx="0">
+            <a:schemeClr val="accent1"/>
+          </a:fillRef>
+          <a:effectRef idx="0">
+            <a:schemeClr val="accent1"/>
+          </a:effectRef>
+          <a:fontRef idx="minor">
+            <a:schemeClr val="tx1"/>
+          </a:fontRef>
+        </p:style>
+      </p:cxnSp>
+      <p:cxnSp>
+        <p:nvCxnSpPr>
+          <p:cNvPr id="74" name="Straight Connector 73">
+            <a:extLst>
+              <a:ext uri="{FF2B5EF4-FFF2-40B4-BE49-F238E27FC236}">
+                <a16:creationId xmlns:a16="http://schemas.microsoft.com/office/drawing/2014/main" id="{A4D629FA-A055-468D-B971-865599148F0A}"/>
+              </a:ext>
+            </a:extLst>
+          </p:cNvPr>
+          <p:cNvCxnSpPr>
+            <a:cxnSpLocks/>
+          </p:cNvCxnSpPr>
+          <p:nvPr/>
+        </p:nvCxnSpPr>
+        <p:spPr>
+          <a:xfrm flipH="1">
+            <a:off x="7331995" y="2027825"/>
+            <a:ext cx="598010" cy="0"/>
+          </a:xfrm>
+          <a:prstGeom prst="line">
+            <a:avLst/>
+          </a:prstGeom>
+          <a:ln w="76200">
+            <a:solidFill>
+              <a:schemeClr val="tx2"/>
+            </a:solidFill>
+          </a:ln>
+        </p:spPr>
+        <p:style>
+          <a:lnRef idx="1">
+            <a:schemeClr val="accent1"/>
+          </a:lnRef>
+          <a:fillRef idx="0">
+            <a:schemeClr val="accent1"/>
+          </a:fillRef>
+          <a:effectRef idx="0">
+            <a:schemeClr val="accent1"/>
+          </a:effectRef>
+          <a:fontRef idx="minor">
+            <a:schemeClr val="tx1"/>
+          </a:fontRef>
+        </p:style>
+      </p:cxnSp>
+      <p:cxnSp>
+        <p:nvCxnSpPr>
+          <p:cNvPr id="77" name="Straight Connector 76">
+            <a:extLst>
+              <a:ext uri="{FF2B5EF4-FFF2-40B4-BE49-F238E27FC236}">
+                <a16:creationId xmlns:a16="http://schemas.microsoft.com/office/drawing/2014/main" id="{0BE14478-805E-440F-AB77-E0432D09E92C}"/>
+              </a:ext>
+            </a:extLst>
+          </p:cNvPr>
+          <p:cNvCxnSpPr>
+            <a:cxnSpLocks/>
+          </p:cNvCxnSpPr>
+          <p:nvPr/>
+        </p:nvCxnSpPr>
+        <p:spPr>
+          <a:xfrm>
+            <a:off x="7348378" y="2037537"/>
+            <a:ext cx="581627" cy="1878399"/>
+          </a:xfrm>
+          <a:prstGeom prst="line">
+            <a:avLst/>
+          </a:prstGeom>
+          <a:ln w="76200">
+            <a:solidFill>
+              <a:schemeClr val="tx2"/>
+            </a:solidFill>
+          </a:ln>
+        </p:spPr>
+        <p:style>
+          <a:lnRef idx="1">
+            <a:schemeClr val="accent1"/>
+          </a:lnRef>
+          <a:fillRef idx="0">
+            <a:schemeClr val="accent1"/>
+          </a:fillRef>
+          <a:effectRef idx="0">
+            <a:schemeClr val="accent1"/>
+          </a:effectRef>
+          <a:fontRef idx="minor">
+            <a:schemeClr val="tx1"/>
+          </a:fontRef>
+        </p:style>
+      </p:cxnSp>
+      <p:cxnSp>
+        <p:nvCxnSpPr>
+          <p:cNvPr id="80" name="Straight Connector 79">
+            <a:extLst>
+              <a:ext uri="{FF2B5EF4-FFF2-40B4-BE49-F238E27FC236}">
+                <a16:creationId xmlns:a16="http://schemas.microsoft.com/office/drawing/2014/main" id="{CAC1FDCD-C208-4946-B038-6C747BEC9672}"/>
+              </a:ext>
+            </a:extLst>
+          </p:cNvPr>
+          <p:cNvCxnSpPr>
+            <a:cxnSpLocks/>
+          </p:cNvCxnSpPr>
+          <p:nvPr/>
+        </p:nvCxnSpPr>
+        <p:spPr>
+          <a:xfrm flipH="1">
+            <a:off x="7313137" y="3915936"/>
+            <a:ext cx="611175" cy="1206943"/>
+          </a:xfrm>
+          <a:prstGeom prst="line">
+            <a:avLst/>
+          </a:prstGeom>
+          <a:ln w="76200">
+            <a:solidFill>
+              <a:schemeClr val="tx2"/>
+            </a:solidFill>
+          </a:ln>
+        </p:spPr>
+        <p:style>
+          <a:lnRef idx="1">
+            <a:schemeClr val="accent1"/>
+          </a:lnRef>
+          <a:fillRef idx="0">
+            <a:schemeClr val="accent1"/>
+          </a:fillRef>
+          <a:effectRef idx="0">
+            <a:schemeClr val="accent1"/>
+          </a:effectRef>
+          <a:fontRef idx="minor">
+            <a:schemeClr val="tx1"/>
+          </a:fontRef>
+        </p:style>
+      </p:cxnSp>
+      <p:cxnSp>
+        <p:nvCxnSpPr>
+          <p:cNvPr id="83" name="Straight Connector 82">
+            <a:extLst>
+              <a:ext uri="{FF2B5EF4-FFF2-40B4-BE49-F238E27FC236}">
+                <a16:creationId xmlns:a16="http://schemas.microsoft.com/office/drawing/2014/main" id="{6CA7C2F1-C122-4575-B73C-4CE65F9210A8}"/>
+              </a:ext>
+            </a:extLst>
+          </p:cNvPr>
+          <p:cNvCxnSpPr>
+            <a:cxnSpLocks/>
+          </p:cNvCxnSpPr>
+          <p:nvPr/>
+        </p:nvCxnSpPr>
+        <p:spPr>
+          <a:xfrm flipH="1">
+            <a:off x="7313137" y="5122879"/>
+            <a:ext cx="611175" cy="0"/>
+          </a:xfrm>
+          <a:prstGeom prst="line">
+            <a:avLst/>
+          </a:prstGeom>
+          <a:ln w="76200">
+            <a:solidFill>
+              <a:schemeClr val="tx2"/>
+            </a:solidFill>
+          </a:ln>
+        </p:spPr>
+        <p:style>
+          <a:lnRef idx="1">
+            <a:schemeClr val="accent1"/>
+          </a:lnRef>
+          <a:fillRef idx="0">
+            <a:schemeClr val="accent1"/>
+          </a:fillRef>
+          <a:effectRef idx="0">
+            <a:schemeClr val="accent1"/>
+          </a:effectRef>
+          <a:fontRef idx="minor">
+            <a:schemeClr val="tx1"/>
+          </a:fontRef>
+        </p:style>
+      </p:cxnSp>
+      <p:cxnSp>
+        <p:nvCxnSpPr>
+          <p:cNvPr id="86" name="Straight Connector 85">
+            <a:extLst>
+              <a:ext uri="{FF2B5EF4-FFF2-40B4-BE49-F238E27FC236}">
+                <a16:creationId xmlns:a16="http://schemas.microsoft.com/office/drawing/2014/main" id="{402390F8-9EEE-449B-8707-356DDA87706E}"/>
+              </a:ext>
+            </a:extLst>
+          </p:cNvPr>
+          <p:cNvCxnSpPr>
+            <a:cxnSpLocks/>
+          </p:cNvCxnSpPr>
+          <p:nvPr/>
+        </p:nvCxnSpPr>
+        <p:spPr>
+          <a:xfrm flipH="1">
+            <a:off x="7923336" y="5103456"/>
+            <a:ext cx="1" cy="690879"/>
+          </a:xfrm>
+          <a:prstGeom prst="line">
+            <a:avLst/>
+          </a:prstGeom>
+          <a:ln w="76200">
+            <a:solidFill>
+              <a:schemeClr val="tx2"/>
+            </a:solidFill>
+          </a:ln>
+        </p:spPr>
+        <p:style>
+          <a:lnRef idx="1">
+            <a:schemeClr val="accent1"/>
+          </a:lnRef>
+          <a:fillRef idx="0">
+            <a:schemeClr val="accent1"/>
+          </a:fillRef>
+          <a:effectRef idx="0">
+            <a:schemeClr val="accent1"/>
+          </a:effectRef>
+          <a:fontRef idx="minor">
+            <a:schemeClr val="tx1"/>
+          </a:fontRef>
+        </p:style>
+      </p:cxnSp>
+      <p:cxnSp>
+        <p:nvCxnSpPr>
+          <p:cNvPr id="88" name="Straight Connector 87">
+            <a:extLst>
+              <a:ext uri="{FF2B5EF4-FFF2-40B4-BE49-F238E27FC236}">
+                <a16:creationId xmlns:a16="http://schemas.microsoft.com/office/drawing/2014/main" id="{871DE83E-F62A-4EF3-979D-5CE54E038C76}"/>
+              </a:ext>
+            </a:extLst>
+          </p:cNvPr>
+          <p:cNvCxnSpPr>
+            <a:cxnSpLocks/>
+          </p:cNvCxnSpPr>
+          <p:nvPr/>
+        </p:nvCxnSpPr>
+        <p:spPr>
+          <a:xfrm flipH="1" flipV="1">
+            <a:off x="7913869" y="5122879"/>
+            <a:ext cx="1857246" cy="671456"/>
+          </a:xfrm>
+          <a:prstGeom prst="line">
+            <a:avLst/>
+          </a:prstGeom>
+          <a:ln w="76200">
+            <a:solidFill>
+              <a:schemeClr val="tx2"/>
+            </a:solidFill>
+          </a:ln>
+        </p:spPr>
+        <p:style>
+          <a:lnRef idx="1">
+            <a:schemeClr val="accent1"/>
+          </a:lnRef>
+          <a:fillRef idx="0">
+            <a:schemeClr val="accent1"/>
+          </a:fillRef>
+          <a:effectRef idx="0">
+            <a:schemeClr val="accent1"/>
+          </a:effectRef>
+          <a:fontRef idx="minor">
+            <a:schemeClr val="tx1"/>
+          </a:fontRef>
+        </p:style>
+      </p:cxnSp>
+      <p:cxnSp>
+        <p:nvCxnSpPr>
+          <p:cNvPr id="91" name="Straight Connector 90">
+            <a:extLst>
+              <a:ext uri="{FF2B5EF4-FFF2-40B4-BE49-F238E27FC236}">
+                <a16:creationId xmlns:a16="http://schemas.microsoft.com/office/drawing/2014/main" id="{8D7DD08C-8847-4881-B7F6-CB956F51413F}"/>
+              </a:ext>
+            </a:extLst>
+          </p:cNvPr>
+          <p:cNvCxnSpPr>
+            <a:cxnSpLocks/>
+          </p:cNvCxnSpPr>
+          <p:nvPr/>
+        </p:nvCxnSpPr>
+        <p:spPr>
+          <a:xfrm flipH="1">
+            <a:off x="4832511" y="1998771"/>
+            <a:ext cx="685516" cy="710152"/>
+          </a:xfrm>
+          <a:prstGeom prst="line">
+            <a:avLst/>
+          </a:prstGeom>
+          <a:ln w="76200">
+            <a:solidFill>
+              <a:schemeClr val="tx2"/>
+            </a:solidFill>
+          </a:ln>
+        </p:spPr>
+        <p:style>
+          <a:lnRef idx="1">
+            <a:schemeClr val="accent1"/>
+          </a:lnRef>
+          <a:fillRef idx="0">
+            <a:schemeClr val="accent1"/>
+          </a:fillRef>
+          <a:effectRef idx="0">
+            <a:schemeClr val="accent1"/>
+          </a:effectRef>
+          <a:fontRef idx="minor">
+            <a:schemeClr val="tx1"/>
+          </a:fontRef>
+        </p:style>
+      </p:cxnSp>
+      <p:cxnSp>
+        <p:nvCxnSpPr>
+          <p:cNvPr id="94" name="Straight Connector 93">
+            <a:extLst>
+              <a:ext uri="{FF2B5EF4-FFF2-40B4-BE49-F238E27FC236}">
+                <a16:creationId xmlns:a16="http://schemas.microsoft.com/office/drawing/2014/main" id="{341AB631-1893-4777-B34C-AF29EEBC498A}"/>
+              </a:ext>
+            </a:extLst>
+          </p:cNvPr>
+          <p:cNvCxnSpPr>
+            <a:cxnSpLocks/>
+          </p:cNvCxnSpPr>
+          <p:nvPr/>
+        </p:nvCxnSpPr>
+        <p:spPr>
+          <a:xfrm>
+            <a:off x="4314131" y="1996526"/>
+            <a:ext cx="518127" cy="712397"/>
+          </a:xfrm>
+          <a:prstGeom prst="line">
+            <a:avLst/>
+          </a:prstGeom>
+          <a:ln w="76200">
+            <a:solidFill>
+              <a:schemeClr val="tx2"/>
+            </a:solidFill>
+          </a:ln>
+        </p:spPr>
+        <p:style>
+          <a:lnRef idx="1">
+            <a:schemeClr val="accent1"/>
+          </a:lnRef>
+          <a:fillRef idx="0">
+            <a:schemeClr val="accent1"/>
+          </a:fillRef>
+          <a:effectRef idx="0">
+            <a:schemeClr val="accent1"/>
+          </a:effectRef>
+          <a:fontRef idx="minor">
+            <a:schemeClr val="tx1"/>
+          </a:fontRef>
+        </p:style>
+      </p:cxnSp>
+      <p:cxnSp>
+        <p:nvCxnSpPr>
+          <p:cNvPr id="97" name="Straight Connector 96">
+            <a:extLst>
+              <a:ext uri="{FF2B5EF4-FFF2-40B4-BE49-F238E27FC236}">
+                <a16:creationId xmlns:a16="http://schemas.microsoft.com/office/drawing/2014/main" id="{F3AA350D-ECF5-4E0B-BE0F-83A2E7396AC4}"/>
+              </a:ext>
+            </a:extLst>
+          </p:cNvPr>
+          <p:cNvCxnSpPr>
+            <a:cxnSpLocks/>
+          </p:cNvCxnSpPr>
+          <p:nvPr/>
+        </p:nvCxnSpPr>
+        <p:spPr>
+          <a:xfrm>
+            <a:off x="4322284" y="2018114"/>
+            <a:ext cx="582203" cy="3085342"/>
+          </a:xfrm>
+          <a:prstGeom prst="line">
+            <a:avLst/>
+          </a:prstGeom>
+          <a:ln w="76200">
+            <a:solidFill>
+              <a:schemeClr val="tx2"/>
+            </a:solidFill>
+          </a:ln>
+        </p:spPr>
+        <p:style>
+          <a:lnRef idx="1">
+            <a:schemeClr val="accent1"/>
+          </a:lnRef>
+          <a:fillRef idx="0">
+            <a:schemeClr val="accent1"/>
+          </a:fillRef>
+          <a:effectRef idx="0">
+            <a:schemeClr val="accent1"/>
+          </a:effectRef>
+          <a:fontRef idx="minor">
+            <a:schemeClr val="tx1"/>
+          </a:fontRef>
+        </p:style>
+      </p:cxnSp>
+      <p:cxnSp>
+        <p:nvCxnSpPr>
+          <p:cNvPr id="100" name="Straight Connector 99">
+            <a:extLst>
+              <a:ext uri="{FF2B5EF4-FFF2-40B4-BE49-F238E27FC236}">
+                <a16:creationId xmlns:a16="http://schemas.microsoft.com/office/drawing/2014/main" id="{020088B4-09E5-4BD9-94E4-2AF454B8224A}"/>
+              </a:ext>
+            </a:extLst>
+          </p:cNvPr>
+          <p:cNvCxnSpPr>
+            <a:cxnSpLocks/>
+          </p:cNvCxnSpPr>
+          <p:nvPr/>
+        </p:nvCxnSpPr>
+        <p:spPr>
+          <a:xfrm flipH="1">
+            <a:off x="4307342" y="5068349"/>
+            <a:ext cx="3887" cy="1293303"/>
+          </a:xfrm>
+          <a:prstGeom prst="line">
+            <a:avLst/>
+          </a:prstGeom>
+          <a:ln w="76200">
+            <a:solidFill>
+              <a:schemeClr val="tx2"/>
+            </a:solidFill>
+          </a:ln>
+        </p:spPr>
+        <p:style>
+          <a:lnRef idx="1">
+            <a:schemeClr val="accent1"/>
+          </a:lnRef>
+          <a:fillRef idx="0">
+            <a:schemeClr val="accent1"/>
+          </a:fillRef>
+          <a:effectRef idx="0">
+            <a:schemeClr val="accent1"/>
+          </a:effectRef>
+          <a:fontRef idx="minor">
+            <a:schemeClr val="tx1"/>
+          </a:fontRef>
+        </p:style>
+      </p:cxnSp>
+      <p:cxnSp>
+        <p:nvCxnSpPr>
+          <p:cNvPr id="103" name="Straight Connector 102">
+            <a:extLst>
+              <a:ext uri="{FF2B5EF4-FFF2-40B4-BE49-F238E27FC236}">
+                <a16:creationId xmlns:a16="http://schemas.microsoft.com/office/drawing/2014/main" id="{D0FC2602-881E-4897-9201-F3BB0CB5BC72}"/>
+              </a:ext>
+            </a:extLst>
+          </p:cNvPr>
+          <p:cNvCxnSpPr>
+            <a:cxnSpLocks/>
+          </p:cNvCxnSpPr>
+          <p:nvPr/>
+        </p:nvCxnSpPr>
+        <p:spPr>
+          <a:xfrm flipH="1">
+            <a:off x="1896336" y="5794335"/>
+            <a:ext cx="1789857" cy="567317"/>
+          </a:xfrm>
+          <a:prstGeom prst="line">
+            <a:avLst/>
+          </a:prstGeom>
+          <a:ln w="76200">
+            <a:solidFill>
+              <a:schemeClr val="tx2"/>
+            </a:solidFill>
+          </a:ln>
+        </p:spPr>
+        <p:style>
+          <a:lnRef idx="1">
+            <a:schemeClr val="accent1"/>
+          </a:lnRef>
+          <a:fillRef idx="0">
+            <a:schemeClr val="accent1"/>
+          </a:fillRef>
+          <a:effectRef idx="0">
+            <a:schemeClr val="accent1"/>
+          </a:effectRef>
+          <a:fontRef idx="minor">
+            <a:schemeClr val="tx1"/>
+          </a:fontRef>
+        </p:style>
+      </p:cxnSp>
+      <p:cxnSp>
+        <p:nvCxnSpPr>
+          <p:cNvPr id="106" name="Straight Connector 105">
+            <a:extLst>
+              <a:ext uri="{FF2B5EF4-FFF2-40B4-BE49-F238E27FC236}">
+                <a16:creationId xmlns:a16="http://schemas.microsoft.com/office/drawing/2014/main" id="{1E565C8B-4697-4377-B22C-5FC26481DD7B}"/>
+              </a:ext>
+            </a:extLst>
+          </p:cNvPr>
+          <p:cNvCxnSpPr>
+            <a:cxnSpLocks/>
+            <a:stCxn id="48" idx="2"/>
+          </p:cNvCxnSpPr>
+          <p:nvPr/>
+        </p:nvCxnSpPr>
+        <p:spPr>
+          <a:xfrm>
+            <a:off x="1225115" y="5253015"/>
+            <a:ext cx="663945" cy="494843"/>
+          </a:xfrm>
+          <a:prstGeom prst="line">
+            <a:avLst/>
+          </a:prstGeom>
+          <a:ln w="76200">
+            <a:solidFill>
+              <a:schemeClr val="tx2"/>
+            </a:solidFill>
+          </a:ln>
+        </p:spPr>
+        <p:style>
+          <a:lnRef idx="1">
+            <a:schemeClr val="accent1"/>
+          </a:lnRef>
+          <a:fillRef idx="0">
+            <a:schemeClr val="accent1"/>
+          </a:fillRef>
+          <a:effectRef idx="0">
+            <a:schemeClr val="accent1"/>
+          </a:effectRef>
+          <a:fontRef idx="minor">
+            <a:schemeClr val="tx1"/>
+          </a:fontRef>
+        </p:style>
+      </p:cxnSp>
+      <p:cxnSp>
+        <p:nvCxnSpPr>
+          <p:cNvPr id="109" name="Straight Connector 108">
+            <a:extLst>
+              <a:ext uri="{FF2B5EF4-FFF2-40B4-BE49-F238E27FC236}">
+                <a16:creationId xmlns:a16="http://schemas.microsoft.com/office/drawing/2014/main" id="{F8867CC5-BE2F-4E31-BE99-17D993D00B23}"/>
+              </a:ext>
+            </a:extLst>
+          </p:cNvPr>
+          <p:cNvCxnSpPr>
+            <a:cxnSpLocks/>
+          </p:cNvCxnSpPr>
+          <p:nvPr/>
+        </p:nvCxnSpPr>
+        <p:spPr>
+          <a:xfrm flipH="1">
+            <a:off x="1863418" y="4518668"/>
+            <a:ext cx="1221399" cy="633584"/>
+          </a:xfrm>
+          <a:prstGeom prst="line">
+            <a:avLst/>
+          </a:prstGeom>
+          <a:ln w="76200">
+            <a:solidFill>
+              <a:schemeClr val="tx2"/>
+            </a:solidFill>
+          </a:ln>
+        </p:spPr>
+        <p:style>
+          <a:lnRef idx="1">
+            <a:schemeClr val="accent1"/>
+          </a:lnRef>
+          <a:fillRef idx="0">
+            <a:schemeClr val="accent1"/>
+          </a:fillRef>
+          <a:effectRef idx="0">
+            <a:schemeClr val="accent1"/>
+          </a:effectRef>
+          <a:fontRef idx="minor">
+            <a:schemeClr val="tx1"/>
+          </a:fontRef>
+        </p:style>
+      </p:cxnSp>
+      <p:cxnSp>
+        <p:nvCxnSpPr>
+          <p:cNvPr id="111" name="Straight Connector 110">
+            <a:extLst>
+              <a:ext uri="{FF2B5EF4-FFF2-40B4-BE49-F238E27FC236}">
+                <a16:creationId xmlns:a16="http://schemas.microsoft.com/office/drawing/2014/main" id="{38094F9A-ECC4-44C6-A2BD-DE789A48B3A6}"/>
+              </a:ext>
+            </a:extLst>
+          </p:cNvPr>
+          <p:cNvCxnSpPr>
+            <a:cxnSpLocks/>
+          </p:cNvCxnSpPr>
+          <p:nvPr/>
+        </p:nvCxnSpPr>
+        <p:spPr>
+          <a:xfrm>
+            <a:off x="3094284" y="4554736"/>
+            <a:ext cx="530975" cy="548720"/>
+          </a:xfrm>
+          <a:prstGeom prst="line">
+            <a:avLst/>
+          </a:prstGeom>
+          <a:ln w="76200">
+            <a:solidFill>
+              <a:schemeClr val="tx2"/>
+            </a:solidFill>
+          </a:ln>
+        </p:spPr>
+        <p:style>
+          <a:lnRef idx="1">
+            <a:schemeClr val="accent1"/>
+          </a:lnRef>
+          <a:fillRef idx="0">
+            <a:schemeClr val="accent1"/>
+          </a:fillRef>
+          <a:effectRef idx="0">
+            <a:schemeClr val="accent1"/>
+          </a:effectRef>
+          <a:fontRef idx="minor">
+            <a:schemeClr val="tx1"/>
+          </a:fontRef>
+        </p:style>
+      </p:cxnSp>
+      <p:cxnSp>
+        <p:nvCxnSpPr>
+          <p:cNvPr id="114" name="Straight Connector 113">
+            <a:extLst>
+              <a:ext uri="{FF2B5EF4-FFF2-40B4-BE49-F238E27FC236}">
+                <a16:creationId xmlns:a16="http://schemas.microsoft.com/office/drawing/2014/main" id="{6D11B892-5FB0-4BA9-A3F7-D949B96FE35C}"/>
+              </a:ext>
+            </a:extLst>
+          </p:cNvPr>
+          <p:cNvCxnSpPr>
+            <a:cxnSpLocks/>
+          </p:cNvCxnSpPr>
+          <p:nvPr/>
+        </p:nvCxnSpPr>
+        <p:spPr>
+          <a:xfrm>
+            <a:off x="3038238" y="2680888"/>
+            <a:ext cx="615031" cy="2441990"/>
+          </a:xfrm>
+          <a:prstGeom prst="line">
+            <a:avLst/>
+          </a:prstGeom>
+          <a:ln w="76200">
+            <a:solidFill>
+              <a:schemeClr val="tx2"/>
+            </a:solidFill>
+          </a:ln>
+        </p:spPr>
+        <p:style>
+          <a:lnRef idx="1">
+            <a:schemeClr val="accent1"/>
+          </a:lnRef>
+          <a:fillRef idx="0">
+            <a:schemeClr val="accent1"/>
+          </a:fillRef>
+          <a:effectRef idx="0">
+            <a:schemeClr val="accent1"/>
+          </a:effectRef>
+          <a:fontRef idx="minor">
+            <a:schemeClr val="tx1"/>
+          </a:fontRef>
+        </p:style>
+      </p:cxnSp>
+      <p:cxnSp>
+        <p:nvCxnSpPr>
+          <p:cNvPr id="117" name="Straight Connector 116">
+            <a:extLst>
+              <a:ext uri="{FF2B5EF4-FFF2-40B4-BE49-F238E27FC236}">
+                <a16:creationId xmlns:a16="http://schemas.microsoft.com/office/drawing/2014/main" id="{F22CB94F-4112-465F-9234-0DE226328EB2}"/>
+              </a:ext>
+            </a:extLst>
+          </p:cNvPr>
+          <p:cNvCxnSpPr>
+            <a:cxnSpLocks/>
+            <a:stCxn id="19" idx="1"/>
+          </p:cNvCxnSpPr>
+          <p:nvPr/>
+        </p:nvCxnSpPr>
+        <p:spPr>
+          <a:xfrm flipH="1">
+            <a:off x="3037985" y="2023146"/>
+            <a:ext cx="513576" cy="679823"/>
+          </a:xfrm>
+          <a:prstGeom prst="line">
+            <a:avLst/>
+          </a:prstGeom>
+          <a:ln w="76200">
+            <a:solidFill>
+              <a:schemeClr val="tx2"/>
+            </a:solidFill>
+          </a:ln>
+        </p:spPr>
+        <p:style>
+          <a:lnRef idx="1">
+            <a:schemeClr val="accent1"/>
+          </a:lnRef>
+          <a:fillRef idx="0">
+            <a:schemeClr val="accent1"/>
+          </a:fillRef>
+          <a:effectRef idx="0">
+            <a:schemeClr val="accent1"/>
+          </a:effectRef>
+          <a:fontRef idx="minor">
+            <a:schemeClr val="tx1"/>
+          </a:fontRef>
+        </p:style>
+      </p:cxnSp>
+      <p:cxnSp>
+        <p:nvCxnSpPr>
+          <p:cNvPr id="120" name="Straight Connector 119">
+            <a:extLst>
+              <a:ext uri="{FF2B5EF4-FFF2-40B4-BE49-F238E27FC236}">
+                <a16:creationId xmlns:a16="http://schemas.microsoft.com/office/drawing/2014/main" id="{DF30E7A7-837E-4B2C-BA82-8CF6A1031877}"/>
+              </a:ext>
+            </a:extLst>
+          </p:cNvPr>
+          <p:cNvCxnSpPr>
+            <a:cxnSpLocks/>
+            <a:stCxn id="17" idx="2"/>
+          </p:cNvCxnSpPr>
+          <p:nvPr/>
+        </p:nvCxnSpPr>
+        <p:spPr>
+          <a:xfrm>
+            <a:off x="2499061" y="2149089"/>
+            <a:ext cx="556195" cy="535297"/>
+          </a:xfrm>
+          <a:prstGeom prst="line">
+            <a:avLst/>
+          </a:prstGeom>
+          <a:ln w="76200">
+            <a:solidFill>
+              <a:schemeClr val="tx2"/>
+            </a:solidFill>
+          </a:ln>
+        </p:spPr>
+        <p:style>
+          <a:lnRef idx="1">
+            <a:schemeClr val="accent1"/>
+          </a:lnRef>
+          <a:fillRef idx="0">
+            <a:schemeClr val="accent1"/>
+          </a:fillRef>
+          <a:effectRef idx="0">
+            <a:schemeClr val="accent1"/>
+          </a:effectRef>
+          <a:fontRef idx="minor">
+            <a:schemeClr val="tx1"/>
+          </a:fontRef>
+        </p:style>
+      </p:cxnSp>
+      <p:cxnSp>
+        <p:nvCxnSpPr>
+          <p:cNvPr id="124" name="Straight Connector 123">
+            <a:extLst>
+              <a:ext uri="{FF2B5EF4-FFF2-40B4-BE49-F238E27FC236}">
+                <a16:creationId xmlns:a16="http://schemas.microsoft.com/office/drawing/2014/main" id="{C27A3CA4-C123-44E0-AC37-E2723589840D}"/>
+              </a:ext>
+            </a:extLst>
+          </p:cNvPr>
+          <p:cNvCxnSpPr>
+            <a:cxnSpLocks/>
+            <a:endCxn id="17" idx="2"/>
+          </p:cNvCxnSpPr>
+          <p:nvPr/>
+        </p:nvCxnSpPr>
+        <p:spPr>
+          <a:xfrm>
+            <a:off x="1932361" y="1453909"/>
+            <a:ext cx="566700" cy="695180"/>
+          </a:xfrm>
+          <a:prstGeom prst="line">
+            <a:avLst/>
+          </a:prstGeom>
+          <a:ln w="76200">
+            <a:solidFill>
+              <a:schemeClr val="tx2"/>
+            </a:solidFill>
+          </a:ln>
+        </p:spPr>
+        <p:style>
+          <a:lnRef idx="1">
+            <a:schemeClr val="accent1"/>
+          </a:lnRef>
+          <a:fillRef idx="0">
+            <a:schemeClr val="accent1"/>
+          </a:fillRef>
+          <a:effectRef idx="0">
+            <a:schemeClr val="accent1"/>
+          </a:effectRef>
+          <a:fontRef idx="minor">
+            <a:schemeClr val="tx1"/>
+          </a:fontRef>
+        </p:style>
+      </p:cxnSp>
+      <p:cxnSp>
+        <p:nvCxnSpPr>
+          <p:cNvPr id="127" name="Straight Connector 126">
+            <a:extLst>
+              <a:ext uri="{FF2B5EF4-FFF2-40B4-BE49-F238E27FC236}">
+                <a16:creationId xmlns:a16="http://schemas.microsoft.com/office/drawing/2014/main" id="{3AA6D349-BBD6-4C04-B0FA-566845698B68}"/>
+              </a:ext>
+            </a:extLst>
+          </p:cNvPr>
+          <p:cNvCxnSpPr>
+            <a:cxnSpLocks/>
+          </p:cNvCxnSpPr>
+          <p:nvPr/>
+        </p:nvCxnSpPr>
+        <p:spPr>
+          <a:xfrm>
+            <a:off x="2548533" y="798140"/>
+            <a:ext cx="2957174" cy="576915"/>
+          </a:xfrm>
+          <a:prstGeom prst="line">
+            <a:avLst/>
+          </a:prstGeom>
+          <a:ln w="76200">
+            <a:solidFill>
+              <a:schemeClr val="tx2"/>
+            </a:solidFill>
+          </a:ln>
+        </p:spPr>
+        <p:style>
+          <a:lnRef idx="1">
+            <a:schemeClr val="accent1"/>
+          </a:lnRef>
+          <a:fillRef idx="0">
+            <a:schemeClr val="accent1"/>
+          </a:fillRef>
+          <a:effectRef idx="0">
+            <a:schemeClr val="accent1"/>
+          </a:effectRef>
+          <a:fontRef idx="minor">
+            <a:schemeClr val="tx1"/>
+          </a:fontRef>
+        </p:style>
+      </p:cxnSp>
+    </p:spTree>
+    <p:extLst>
+      <p:ext uri="{BB962C8B-B14F-4D97-AF65-F5344CB8AC3E}">
+        <p14:creationId xmlns:p14="http://schemas.microsoft.com/office/powerpoint/2010/main" val="2339785313"/>
+      </p:ext>
+    </p:extLst>
+  </p:cSld>
+  <p:clrMapOvr>
+    <a:masterClrMapping/>
+  </p:clrMapOvr>
+</p:sld>
+</file>
+
 <file path=ppt/theme/theme1.xml><?xml version="1.0" encoding="utf-8"?>
 <a:theme xmlns:a="http://schemas.openxmlformats.org/drawingml/2006/main" name="Office Theme">
   <a:themeElements>

</xml_diff>